<commit_message>
HW2 and EDA for Amazon_Art
</commit_message>
<xml_diff>
--- a/slides/13_naive_bayes_roc_auc.pptx
+++ b/slides/13_naive_bayes_roc_auc.pptx
@@ -185,7 +185,7 @@
   </p:defaultTextStyle>
   <p:extLst>
     <p:ext uri="{EFAFB233-063F-42B5-8137-9DF3F51BA10A}">
-      <p15:sldGuideLst xmlns:p15="http://schemas.microsoft.com/office/powerpoint/2012/main" xmlns="">
+      <p15:sldGuideLst xmlns:p15="http://schemas.microsoft.com/office/powerpoint/2012/main">
         <p15:guide id="1" orient="horz" pos="1279">
           <p15:clr>
             <a:srgbClr val="A4A3A4"/>
@@ -329,7 +329,7 @@
           <a:p>
             <a:fld id="{DB92F479-4B50-F243-9713-1B12EC2B4BDB}" type="datetimeFigureOut">
               <a:rPr lang="en-US" smtClean="0"/>
-              <a:t>5/10/16</a:t>
+              <a:t>5/9/16</a:t>
             </a:fld>
             <a:endParaRPr lang="en-US"/>
           </a:p>
@@ -956,218 +956,6 @@
               <a:tabLst/>
               <a:defRPr/>
             </a:pPr>
-            <a:r>
-              <a:rPr lang="en-US" sz="1200" baseline="0" dirty="0" smtClean="0">
-                <a:solidFill>
-                  <a:prstClr val="black"/>
-                </a:solidFill>
-                <a:latin typeface="ArialMT"/>
-                <a:sym typeface="Wingdings"/>
-              </a:rPr>
-              <a:t>Sensitivity = p(positive test given that you have cancer)</a:t>
-            </a:r>
-          </a:p>
-          <a:p>
-            <a:pPr marL="0" marR="0" indent="0" algn="l" defTabSz="457200" rtl="0" eaLnBrk="1" fontAlgn="auto" latinLnBrk="0" hangingPunct="1">
-              <a:lnSpc>
-                <a:spcPct val="100000"/>
-              </a:lnSpc>
-              <a:spcBef>
-                <a:spcPts val="0"/>
-              </a:spcBef>
-              <a:spcAft>
-                <a:spcPts val="0"/>
-              </a:spcAft>
-              <a:buClrTx/>
-              <a:buSzTx/>
-              <a:buFontTx/>
-              <a:buNone/>
-              <a:tabLst/>
-              <a:defRPr/>
-            </a:pPr>
-            <a:r>
-              <a:rPr lang="en-US" sz="1200" baseline="0" dirty="0" smtClean="0">
-                <a:solidFill>
-                  <a:prstClr val="black"/>
-                </a:solidFill>
-                <a:latin typeface="ArialMT"/>
-                <a:sym typeface="Wingdings"/>
-              </a:rPr>
-              <a:t>	given that you have cancer, how correct is the test</a:t>
-            </a:r>
-          </a:p>
-          <a:p>
-            <a:pPr marL="0" marR="0" indent="0" algn="l" defTabSz="457200" rtl="0" eaLnBrk="1" fontAlgn="auto" latinLnBrk="0" hangingPunct="1">
-              <a:lnSpc>
-                <a:spcPct val="100000"/>
-              </a:lnSpc>
-              <a:spcBef>
-                <a:spcPts val="0"/>
-              </a:spcBef>
-              <a:spcAft>
-                <a:spcPts val="0"/>
-              </a:spcAft>
-              <a:buClrTx/>
-              <a:buSzTx/>
-              <a:buFontTx/>
-              <a:buNone/>
-              <a:tabLst/>
-              <a:defRPr/>
-            </a:pPr>
-            <a:r>
-              <a:rPr lang="en-US" sz="1200" baseline="0" dirty="0" smtClean="0">
-                <a:solidFill>
-                  <a:prstClr val="black"/>
-                </a:solidFill>
-                <a:latin typeface="ArialMT"/>
-                <a:sym typeface="Wingdings"/>
-              </a:rPr>
-              <a:t>Specificity = p(negative given that you don’t have cancer)</a:t>
-            </a:r>
-          </a:p>
-          <a:p>
-            <a:pPr marL="0" marR="0" indent="0" algn="l" defTabSz="457200" rtl="0" eaLnBrk="1" fontAlgn="auto" latinLnBrk="0" hangingPunct="1">
-              <a:lnSpc>
-                <a:spcPct val="100000"/>
-              </a:lnSpc>
-              <a:spcBef>
-                <a:spcPts val="0"/>
-              </a:spcBef>
-              <a:spcAft>
-                <a:spcPts val="0"/>
-              </a:spcAft>
-              <a:buClrTx/>
-              <a:buSzTx/>
-              <a:buFontTx/>
-              <a:buNone/>
-              <a:tabLst/>
-              <a:defRPr/>
-            </a:pPr>
-            <a:r>
-              <a:rPr lang="en-US" sz="1200" baseline="0" dirty="0" smtClean="0">
-                <a:solidFill>
-                  <a:prstClr val="black"/>
-                </a:solidFill>
-                <a:latin typeface="ArialMT"/>
-                <a:sym typeface="Wingdings"/>
-              </a:rPr>
-              <a:t>	given that you don</a:t>
-            </a:r>
-            <a:r>
-              <a:rPr lang="uk-UA" sz="1200" baseline="0" dirty="0" smtClean="0">
-                <a:solidFill>
-                  <a:prstClr val="black"/>
-                </a:solidFill>
-                <a:latin typeface="ArialMT"/>
-                <a:sym typeface="Wingdings"/>
-              </a:rPr>
-              <a:t>’</a:t>
-            </a:r>
-            <a:r>
-              <a:rPr lang="en-US" sz="1200" baseline="0" dirty="0" smtClean="0">
-                <a:solidFill>
-                  <a:prstClr val="black"/>
-                </a:solidFill>
-                <a:latin typeface="ArialMT"/>
-                <a:sym typeface="Wingdings"/>
-              </a:rPr>
-              <a:t>t have cancer how often does the test tell you you don</a:t>
-            </a:r>
-            <a:r>
-              <a:rPr lang="uk-UA" sz="1200" baseline="0" dirty="0" smtClean="0">
-                <a:solidFill>
-                  <a:prstClr val="black"/>
-                </a:solidFill>
-                <a:latin typeface="ArialMT"/>
-                <a:sym typeface="Wingdings"/>
-              </a:rPr>
-              <a:t>’</a:t>
-            </a:r>
-            <a:r>
-              <a:rPr lang="en-US" sz="1200" baseline="0" dirty="0" smtClean="0">
-                <a:solidFill>
-                  <a:prstClr val="black"/>
-                </a:solidFill>
-                <a:latin typeface="ArialMT"/>
-                <a:sym typeface="Wingdings"/>
-              </a:rPr>
-              <a:t>t</a:t>
-            </a:r>
-          </a:p>
-          <a:p>
-            <a:pPr marL="0" marR="0" indent="0" algn="l" defTabSz="457200" rtl="0" eaLnBrk="1" fontAlgn="auto" latinLnBrk="0" hangingPunct="1">
-              <a:lnSpc>
-                <a:spcPct val="100000"/>
-              </a:lnSpc>
-              <a:spcBef>
-                <a:spcPts val="0"/>
-              </a:spcBef>
-              <a:spcAft>
-                <a:spcPts val="0"/>
-              </a:spcAft>
-              <a:buClrTx/>
-              <a:buSzTx/>
-              <a:buFontTx/>
-              <a:buNone/>
-              <a:tabLst/>
-              <a:defRPr/>
-            </a:pPr>
-            <a:endParaRPr lang="en-US" sz="1200" baseline="0" dirty="0" smtClean="0">
-              <a:solidFill>
-                <a:prstClr val="black"/>
-              </a:solidFill>
-              <a:latin typeface="ArialMT"/>
-              <a:sym typeface="Wingdings"/>
-            </a:endParaRPr>
-          </a:p>
-          <a:p>
-            <a:pPr marL="0" marR="0" indent="0" algn="l" defTabSz="457200" rtl="0" eaLnBrk="1" fontAlgn="auto" latinLnBrk="0" hangingPunct="1">
-              <a:lnSpc>
-                <a:spcPct val="100000"/>
-              </a:lnSpc>
-              <a:spcBef>
-                <a:spcPts val="0"/>
-              </a:spcBef>
-              <a:spcAft>
-                <a:spcPts val="0"/>
-              </a:spcAft>
-              <a:buClrTx/>
-              <a:buSzTx/>
-              <a:buFontTx/>
-              <a:buNone/>
-              <a:tabLst/>
-              <a:defRPr/>
-            </a:pPr>
-            <a:r>
-              <a:rPr lang="en-US" sz="1200" baseline="0" dirty="0" smtClean="0">
-                <a:solidFill>
-                  <a:prstClr val="black"/>
-                </a:solidFill>
-                <a:latin typeface="ArialMT"/>
-                <a:sym typeface="Wingdings"/>
-              </a:rPr>
-              <a:t>But people only really care about the true positive rate though (</a:t>
-            </a:r>
-            <a:r>
-              <a:rPr lang="en-US" sz="1200" baseline="0" dirty="0" err="1" smtClean="0">
-                <a:solidFill>
-                  <a:prstClr val="black"/>
-                </a:solidFill>
-                <a:latin typeface="ArialMT"/>
-                <a:sym typeface="Wingdings"/>
-              </a:rPr>
-              <a:t>prob</a:t>
-            </a:r>
-            <a:r>
-              <a:rPr lang="en-US" sz="1200" baseline="0" dirty="0" smtClean="0">
-                <a:solidFill>
-                  <a:prstClr val="black"/>
-                </a:solidFill>
-                <a:latin typeface="ArialMT"/>
-                <a:sym typeface="Wingdings"/>
-              </a:rPr>
-              <a:t> that you have cancer given that the test is positive)</a:t>
-            </a:r>
             <a:endParaRPr lang="en-US" sz="1200" baseline="0" dirty="0" smtClean="0">
               <a:solidFill>
                 <a:prstClr val="black"/>
@@ -1596,35 +1384,6 @@
               <a:tabLst/>
               <a:defRPr/>
             </a:pPr>
-            <a:r>
-              <a:rPr lang="en-US" sz="1200" baseline="0" dirty="0" smtClean="0">
-                <a:solidFill>
-                  <a:prstClr val="black"/>
-                </a:solidFill>
-                <a:latin typeface="ArialMT"/>
-                <a:sym typeface="Wingdings"/>
-              </a:rPr>
-              <a:t>Sensitivity – is easier to find out</a:t>
-            </a:r>
-          </a:p>
-          <a:p>
-            <a:pPr marL="0" marR="0" indent="0" algn="l" defTabSz="457200" rtl="0" eaLnBrk="1" fontAlgn="auto" latinLnBrk="0" hangingPunct="1">
-              <a:lnSpc>
-                <a:spcPct val="100000"/>
-              </a:lnSpc>
-              <a:spcBef>
-                <a:spcPts val="0"/>
-              </a:spcBef>
-              <a:spcAft>
-                <a:spcPts val="0"/>
-              </a:spcAft>
-              <a:buClrTx/>
-              <a:buSzTx/>
-              <a:buFontTx/>
-              <a:buNone/>
-              <a:tabLst/>
-              <a:defRPr/>
-            </a:pPr>
             <a:endParaRPr lang="en-US" sz="1200" baseline="0" dirty="0" smtClean="0">
               <a:solidFill>
                 <a:prstClr val="black"/>
@@ -1822,35 +1581,7 @@
           <a:bodyPr/>
           <a:lstStyle/>
           <a:p>
-            <a:r>
-              <a:rPr lang="en-US" dirty="0" err="1" smtClean="0"/>
-              <a:t>Prob</a:t>
-            </a:r>
-            <a:r>
-              <a:rPr lang="en-US" dirty="0" smtClean="0"/>
-              <a:t> of having the disease</a:t>
-            </a:r>
-            <a:r>
-              <a:rPr lang="en-US" baseline="0" dirty="0" smtClean="0"/>
-              <a:t> if you have a </a:t>
-            </a:r>
-            <a:r>
-              <a:rPr lang="en-US" baseline="0" dirty="0" err="1" smtClean="0"/>
-              <a:t>pos</a:t>
-            </a:r>
-            <a:r>
-              <a:rPr lang="en-US" baseline="0" dirty="0" smtClean="0"/>
-              <a:t> test --- is less </a:t>
-            </a:r>
-            <a:r>
-              <a:rPr lang="en-US" baseline="0" dirty="0" err="1" smtClean="0"/>
-              <a:t>tha</a:t>
-            </a:r>
-            <a:r>
-              <a:rPr lang="en-US" baseline="0" dirty="0" smtClean="0"/>
-              <a:t> 1%. Even with the .99 sensitivity and specificity it’s so low because the disease is so rare</a:t>
-            </a:r>
-            <a:endParaRPr lang="en-US" dirty="0"/>
+            <a:endParaRPr lang="en-US" baseline="0" dirty="0" smtClean="0"/>
           </a:p>
         </p:txBody>
       </p:sp>
@@ -1871,7 +1602,7 @@
           <a:p>
             <a:fld id="{ADD4B5B7-85EF-4E48-AC80-2380FACD9C23}" type="slidenum">
               <a:rPr lang="en-US" smtClean="0"/>
-              <a:t>21</a:t>
+              <a:t>22</a:t>
             </a:fld>
             <a:endParaRPr lang="en-US"/>
           </a:p>
@@ -1880,7 +1611,7 @@
     </p:spTree>
     <p:extLst>
       <p:ext uri="{BB962C8B-B14F-4D97-AF65-F5344CB8AC3E}">
-        <p14:creationId xmlns:p14="http://schemas.microsoft.com/office/powerpoint/2010/main" val="341193842"/>
+        <p14:creationId xmlns:p14="http://schemas.microsoft.com/office/powerpoint/2010/main" val="158773868"/>
       </p:ext>
     </p:extLst>
   </p:cSld>
@@ -1934,90 +1665,30 @@
           <a:bodyPr/>
           <a:lstStyle/>
           <a:p>
-            <a:r>
-              <a:rPr lang="en-US" baseline="0" dirty="0" smtClean="0"/>
-              <a:t>A machine learning model based on </a:t>
-            </a:r>
-            <a:r>
-              <a:rPr lang="en-US" baseline="0" dirty="0" err="1" smtClean="0"/>
-              <a:t>baye’s</a:t>
-            </a:r>
-            <a:r>
-              <a:rPr lang="en-US" baseline="0" dirty="0" smtClean="0"/>
-              <a:t> theorem </a:t>
-            </a:r>
-          </a:p>
-          <a:p>
-            <a:r>
-              <a:rPr lang="en-US" baseline="0" dirty="0" err="1" smtClean="0"/>
-              <a:t>Topid</a:t>
-            </a:r>
-            <a:r>
-              <a:rPr lang="en-US" baseline="0" dirty="0" smtClean="0"/>
-              <a:t> for today – how we use data to update our beliefs</a:t>
-            </a:r>
-          </a:p>
-          <a:p>
-            <a:endParaRPr lang="en-US" baseline="0" dirty="0" smtClean="0"/>
-          </a:p>
-          <a:p>
-            <a:r>
-              <a:rPr lang="en-US" baseline="0" dirty="0" smtClean="0"/>
-              <a:t>Naïve Bayes is particularly good for TEXT – letters e and s are very common – we know the distribution of e and s</a:t>
-            </a:r>
-          </a:p>
-          <a:p>
-            <a:r>
-              <a:rPr lang="en-US" baseline="0" dirty="0" smtClean="0"/>
-              <a:t>	#in general things that follow a distribution tend to work well with naïve </a:t>
-            </a:r>
-            <a:r>
-              <a:rPr lang="en-US" baseline="0" dirty="0" err="1" smtClean="0"/>
-              <a:t>bayes</a:t>
-            </a:r>
-            <a:endParaRPr lang="en-US" baseline="0" dirty="0" smtClean="0"/>
-          </a:p>
-          <a:p>
-            <a:r>
-              <a:rPr lang="en-US" baseline="0" dirty="0" smtClean="0"/>
-              <a:t>	#ELECTIONS follow a distributions and we have the priors</a:t>
-            </a:r>
-          </a:p>
-          <a:p>
-            <a:r>
-              <a:rPr lang="en-US" baseline="0" dirty="0" smtClean="0"/>
-              <a:t>	#weather - what will you do today </a:t>
-            </a:r>
-          </a:p>
-          <a:p>
-            <a:endParaRPr lang="en-US" baseline="0" dirty="0" smtClean="0"/>
-          </a:p>
-          <a:p>
-            <a:r>
-              <a:rPr lang="en-US" baseline="0" dirty="0" smtClean="0"/>
-              <a:t>Also good b/c sometimes the </a:t>
-            </a:r>
-            <a:r>
-              <a:rPr lang="en-US" baseline="0" dirty="0" err="1" smtClean="0"/>
-              <a:t>prob</a:t>
-            </a:r>
-            <a:r>
-              <a:rPr lang="en-US" baseline="0" dirty="0" smtClean="0"/>
-              <a:t> that are hard to get in </a:t>
-            </a:r>
-            <a:r>
-              <a:rPr lang="en-US" baseline="0" dirty="0" err="1" smtClean="0"/>
-              <a:t>practive</a:t>
-            </a:r>
-            <a:r>
-              <a:rPr lang="en-US" baseline="0" dirty="0" smtClean="0"/>
-              <a:t> are not hard to get in </a:t>
-            </a:r>
-            <a:r>
-              <a:rPr lang="en-US" baseline="0" smtClean="0"/>
-              <a:t>bayes</a:t>
-            </a:r>
-            <a:endParaRPr lang="en-US" baseline="0" dirty="0" smtClean="0"/>
+            <a:pPr marL="0" marR="0" indent="0" algn="l" defTabSz="457200" rtl="0" eaLnBrk="1" fontAlgn="auto" latinLnBrk="0" hangingPunct="1">
+              <a:lnSpc>
+                <a:spcPct val="100000"/>
+              </a:lnSpc>
+              <a:spcBef>
+                <a:spcPts val="0"/>
+              </a:spcBef>
+              <a:spcAft>
+                <a:spcPts val="0"/>
+              </a:spcAft>
+              <a:buClrTx/>
+              <a:buSzTx/>
+              <a:buFontTx/>
+              <a:buNone/>
+              <a:tabLst/>
+              <a:defRPr/>
+            </a:pPr>
+            <a:endParaRPr lang="en-US" sz="1200" baseline="0" dirty="0" smtClean="0">
+              <a:solidFill>
+                <a:prstClr val="black"/>
+              </a:solidFill>
+              <a:latin typeface="ArialMT"/>
+              <a:sym typeface="Wingdings"/>
+            </a:endParaRPr>
           </a:p>
         </p:txBody>
       </p:sp>
@@ -2038,7 +1709,7 @@
           <a:p>
             <a:fld id="{ADD4B5B7-85EF-4E48-AC80-2380FACD9C23}" type="slidenum">
               <a:rPr lang="en-US" smtClean="0"/>
-              <a:t>22</a:t>
+              <a:t>23</a:t>
             </a:fld>
             <a:endParaRPr lang="en-US"/>
           </a:p>
@@ -2047,7 +1718,7 @@
     </p:spTree>
     <p:extLst>
       <p:ext uri="{BB962C8B-B14F-4D97-AF65-F5344CB8AC3E}">
-        <p14:creationId xmlns:p14="http://schemas.microsoft.com/office/powerpoint/2010/main" val="158773868"/>
+        <p14:creationId xmlns:p14="http://schemas.microsoft.com/office/powerpoint/2010/main" val="645762702"/>
       </p:ext>
     </p:extLst>
   </p:cSld>
@@ -2202,35 +1873,6 @@
               <a:tabLst/>
               <a:defRPr/>
             </a:pPr>
-            <a:r>
-              <a:rPr lang="en-US" sz="1200" baseline="0" dirty="0" smtClean="0">
-                <a:solidFill>
-                  <a:prstClr val="black"/>
-                </a:solidFill>
-                <a:latin typeface="ArialMT"/>
-                <a:sym typeface="Wingdings"/>
-              </a:rPr>
-              <a:t>Chance of *something happening, given this happened</a:t>
-            </a:r>
-          </a:p>
-          <a:p>
-            <a:pPr marL="0" marR="0" indent="0" algn="l" defTabSz="457200" rtl="0" eaLnBrk="1" fontAlgn="auto" latinLnBrk="0" hangingPunct="1">
-              <a:lnSpc>
-                <a:spcPct val="100000"/>
-              </a:lnSpc>
-              <a:spcBef>
-                <a:spcPts val="0"/>
-              </a:spcBef>
-              <a:spcAft>
-                <a:spcPts val="0"/>
-              </a:spcAft>
-              <a:buClrTx/>
-              <a:buSzTx/>
-              <a:buFontTx/>
-              <a:buNone/>
-              <a:tabLst/>
-              <a:defRPr/>
-            </a:pPr>
             <a:endParaRPr lang="en-US" sz="1200" baseline="0" dirty="0" smtClean="0">
               <a:solidFill>
                 <a:prstClr val="black"/>
@@ -2239,131 +1881,6 @@
               <a:sym typeface="Wingdings"/>
             </a:endParaRPr>
           </a:p>
-          <a:p>
-            <a:pPr marL="0" marR="0" indent="0" algn="l" defTabSz="457200" rtl="0" eaLnBrk="1" fontAlgn="auto" latinLnBrk="0" hangingPunct="1">
-              <a:lnSpc>
-                <a:spcPct val="100000"/>
-              </a:lnSpc>
-              <a:spcBef>
-                <a:spcPts val="0"/>
-              </a:spcBef>
-              <a:spcAft>
-                <a:spcPts val="0"/>
-              </a:spcAft>
-              <a:buClrTx/>
-              <a:buSzTx/>
-              <a:buFontTx/>
-              <a:buNone/>
-              <a:tabLst/>
-              <a:defRPr/>
-            </a:pPr>
-            <a:r>
-              <a:rPr lang="en-US" sz="1200" baseline="0" dirty="0" smtClean="0">
-                <a:solidFill>
-                  <a:prstClr val="black"/>
-                </a:solidFill>
-                <a:latin typeface="ArialMT"/>
-                <a:sym typeface="Wingdings"/>
-              </a:rPr>
-              <a:t>P</a:t>
-            </a:r>
-            <a:r>
-              <a:rPr lang="de-DE" sz="1200" baseline="0" dirty="0" smtClean="0">
-                <a:solidFill>
-                  <a:prstClr val="black"/>
-                </a:solidFill>
-                <a:latin typeface="ArialMT"/>
-                <a:sym typeface="Wingdings"/>
-              </a:rPr>
-              <a:t>© </a:t>
-            </a:r>
-            <a:r>
-              <a:rPr lang="de-DE" sz="1200" baseline="0" dirty="0" err="1" smtClean="0">
-                <a:solidFill>
-                  <a:prstClr val="black"/>
-                </a:solidFill>
-                <a:latin typeface="ArialMT"/>
-                <a:sym typeface="Wingdings"/>
-              </a:rPr>
-              <a:t>given</a:t>
-            </a:r>
-            <a:r>
-              <a:rPr lang="de-DE" sz="1200" baseline="0" dirty="0" smtClean="0">
-                <a:solidFill>
-                  <a:prstClr val="black"/>
-                </a:solidFill>
-                <a:latin typeface="ArialMT"/>
-                <a:sym typeface="Wingdings"/>
-              </a:rPr>
-              <a:t> </a:t>
-            </a:r>
-            <a:r>
-              <a:rPr lang="de-DE" sz="1200" baseline="0" dirty="0" err="1" smtClean="0">
-                <a:solidFill>
-                  <a:prstClr val="black"/>
-                </a:solidFill>
-                <a:latin typeface="ArialMT"/>
-                <a:sym typeface="Wingdings"/>
-              </a:rPr>
-              <a:t>these</a:t>
-            </a:r>
-            <a:r>
-              <a:rPr lang="de-DE" sz="1200" baseline="0" dirty="0" smtClean="0">
-                <a:solidFill>
-                  <a:prstClr val="black"/>
-                </a:solidFill>
-                <a:latin typeface="ArialMT"/>
-                <a:sym typeface="Wingdings"/>
-              </a:rPr>
-              <a:t> </a:t>
-            </a:r>
-            <a:r>
-              <a:rPr lang="de-DE" sz="1200" baseline="0" dirty="0" err="1" smtClean="0">
-                <a:solidFill>
-                  <a:prstClr val="black"/>
-                </a:solidFill>
-                <a:latin typeface="ArialMT"/>
-                <a:sym typeface="Wingdings"/>
-              </a:rPr>
-              <a:t>features</a:t>
-            </a:r>
-            <a:r>
-              <a:rPr lang="de-DE" sz="1200" baseline="0" dirty="0" smtClean="0">
-                <a:solidFill>
-                  <a:prstClr val="black"/>
-                </a:solidFill>
-                <a:latin typeface="ArialMT"/>
-                <a:sym typeface="Wingdings"/>
-              </a:rPr>
-              <a:t>, </a:t>
-            </a:r>
-          </a:p>
-          <a:p>
-            <a:pPr marL="0" marR="0" indent="0" algn="l" defTabSz="457200" rtl="0" eaLnBrk="1" fontAlgn="auto" latinLnBrk="0" hangingPunct="1">
-              <a:lnSpc>
-                <a:spcPct val="100000"/>
-              </a:lnSpc>
-              <a:spcBef>
-                <a:spcPts val="0"/>
-              </a:spcBef>
-              <a:spcAft>
-                <a:spcPts val="0"/>
-              </a:spcAft>
-              <a:buClrTx/>
-              <a:buSzTx/>
-              <a:buFontTx/>
-              <a:buNone/>
-              <a:tabLst/>
-              <a:defRPr/>
-            </a:pPr>
-            <a:endParaRPr lang="de-DE" sz="1200" baseline="0" dirty="0" smtClean="0">
-              <a:solidFill>
-                <a:prstClr val="black"/>
-              </a:solidFill>
-              <a:latin typeface="ArialMT"/>
-              <a:sym typeface="Wingdings"/>
-            </a:endParaRPr>
-          </a:p>
         </p:txBody>
       </p:sp>
       <p:sp>
@@ -2383,7 +1900,7 @@
           <a:p>
             <a:fld id="{ADD4B5B7-85EF-4E48-AC80-2380FACD9C23}" type="slidenum">
               <a:rPr lang="en-US" smtClean="0"/>
-              <a:t>23</a:t>
+              <a:t>24</a:t>
             </a:fld>
             <a:endParaRPr lang="en-US"/>
           </a:p>
@@ -2490,7 +2007,7 @@
           <a:p>
             <a:fld id="{ADD4B5B7-85EF-4E48-AC80-2380FACD9C23}" type="slidenum">
               <a:rPr lang="en-US" smtClean="0"/>
-              <a:t>24</a:t>
+              <a:t>25</a:t>
             </a:fld>
             <a:endParaRPr lang="en-US"/>
           </a:p>
@@ -2597,7 +2114,7 @@
           <a:p>
             <a:fld id="{ADD4B5B7-85EF-4E48-AC80-2380FACD9C23}" type="slidenum">
               <a:rPr lang="en-US" smtClean="0"/>
-              <a:t>25</a:t>
+              <a:t>26</a:t>
             </a:fld>
             <a:endParaRPr lang="en-US"/>
           </a:p>
@@ -2677,35 +2194,6 @@
               <a:tabLst/>
               <a:defRPr/>
             </a:pPr>
-            <a:r>
-              <a:rPr lang="en-US" sz="1200" baseline="0" dirty="0" smtClean="0">
-                <a:solidFill>
-                  <a:prstClr val="black"/>
-                </a:solidFill>
-                <a:latin typeface="ArialMT"/>
-                <a:sym typeface="Wingdings"/>
-              </a:rPr>
-              <a:t>It usually is ignored b/c it is the only number that does not depend on C (our class function)</a:t>
-            </a:r>
-          </a:p>
-          <a:p>
-            <a:pPr marL="0" marR="0" indent="0" algn="l" defTabSz="457200" rtl="0" eaLnBrk="1" fontAlgn="auto" latinLnBrk="0" hangingPunct="1">
-              <a:lnSpc>
-                <a:spcPct val="100000"/>
-              </a:lnSpc>
-              <a:spcBef>
-                <a:spcPts val="0"/>
-              </a:spcBef>
-              <a:spcAft>
-                <a:spcPts val="0"/>
-              </a:spcAft>
-              <a:buClrTx/>
-              <a:buSzTx/>
-              <a:buFontTx/>
-              <a:buNone/>
-              <a:tabLst/>
-              <a:defRPr/>
-            </a:pPr>
             <a:endParaRPr lang="en-US" sz="1200" baseline="0" dirty="0" smtClean="0">
               <a:solidFill>
                 <a:prstClr val="black"/>
@@ -2714,102 +2202,6 @@
               <a:sym typeface="Wingdings"/>
             </a:endParaRPr>
           </a:p>
-          <a:p>
-            <a:pPr marL="0" marR="0" indent="0" algn="l" defTabSz="457200" rtl="0" eaLnBrk="1" fontAlgn="auto" latinLnBrk="0" hangingPunct="1">
-              <a:lnSpc>
-                <a:spcPct val="100000"/>
-              </a:lnSpc>
-              <a:spcBef>
-                <a:spcPts val="0"/>
-              </a:spcBef>
-              <a:spcAft>
-                <a:spcPts val="0"/>
-              </a:spcAft>
-              <a:buClrTx/>
-              <a:buSzTx/>
-              <a:buFontTx/>
-              <a:buNone/>
-              <a:tabLst/>
-              <a:defRPr/>
-            </a:pPr>
-            <a:r>
-              <a:rPr lang="en-US" sz="1200" baseline="0" dirty="0" smtClean="0">
-                <a:solidFill>
-                  <a:prstClr val="black"/>
-                </a:solidFill>
-                <a:latin typeface="ArialMT"/>
-                <a:sym typeface="Wingdings"/>
-              </a:rPr>
-              <a:t>	here it means for </a:t>
-            </a:r>
-            <a:r>
-              <a:rPr lang="en-US" sz="1200" baseline="0" dirty="0" err="1" smtClean="0">
-                <a:solidFill>
-                  <a:prstClr val="black"/>
-                </a:solidFill>
-                <a:latin typeface="ArialMT"/>
-                <a:sym typeface="Wingdings"/>
-              </a:rPr>
-              <a:t>e.g</a:t>
-            </a:r>
-            <a:r>
-              <a:rPr lang="en-US" sz="1200" baseline="0" dirty="0" smtClean="0">
-                <a:solidFill>
-                  <a:prstClr val="black"/>
-                </a:solidFill>
-                <a:latin typeface="ArialMT"/>
-                <a:sym typeface="Wingdings"/>
-              </a:rPr>
-              <a:t> the </a:t>
-            </a:r>
-            <a:r>
-              <a:rPr lang="en-US" sz="1200" baseline="0" dirty="0" err="1" smtClean="0">
-                <a:solidFill>
-                  <a:prstClr val="black"/>
-                </a:solidFill>
-                <a:latin typeface="ArialMT"/>
-                <a:sym typeface="Wingdings"/>
-              </a:rPr>
-              <a:t>prob</a:t>
-            </a:r>
-            <a:r>
-              <a:rPr lang="en-US" sz="1200" baseline="0" dirty="0" smtClean="0">
-                <a:solidFill>
-                  <a:prstClr val="black"/>
-                </a:solidFill>
-                <a:latin typeface="ArialMT"/>
-                <a:sym typeface="Wingdings"/>
-              </a:rPr>
-              <a:t> of a RANDOM email in the world containing the word “</a:t>
-            </a:r>
-            <a:r>
-              <a:rPr lang="en-US" sz="1200" baseline="0" dirty="0" err="1" smtClean="0">
-                <a:solidFill>
-                  <a:prstClr val="black"/>
-                </a:solidFill>
-                <a:latin typeface="ArialMT"/>
-                <a:sym typeface="Wingdings"/>
-              </a:rPr>
-              <a:t>viagra</a:t>
-            </a:r>
-            <a:r>
-              <a:rPr lang="en-US" sz="1200" baseline="0" dirty="0" smtClean="0">
-                <a:solidFill>
-                  <a:prstClr val="black"/>
-                </a:solidFill>
-                <a:latin typeface="ArialMT"/>
-                <a:sym typeface="Wingdings"/>
-              </a:rPr>
-              <a:t>”</a:t>
-            </a:r>
-            <a:endParaRPr lang="en-US" sz="1200" baseline="0" dirty="0" smtClean="0">
-              <a:solidFill>
-                <a:prstClr val="black"/>
-              </a:solidFill>
-              <a:latin typeface="ArialMT"/>
-              <a:sym typeface="Wingdings"/>
-            </a:endParaRPr>
-          </a:p>
         </p:txBody>
       </p:sp>
       <p:sp>
@@ -2829,7 +2221,7 @@
           <a:p>
             <a:fld id="{ADD4B5B7-85EF-4E48-AC80-2380FACD9C23}" type="slidenum">
               <a:rPr lang="en-US" smtClean="0"/>
-              <a:t>26</a:t>
+              <a:t>27</a:t>
             </a:fld>
             <a:endParaRPr lang="en-US"/>
           </a:p>
@@ -2909,35 +2301,6 @@
               <a:tabLst/>
               <a:defRPr/>
             </a:pPr>
-            <a:r>
-              <a:rPr lang="en-US" sz="1200" baseline="0" dirty="0" smtClean="0">
-                <a:solidFill>
-                  <a:prstClr val="black"/>
-                </a:solidFill>
-                <a:latin typeface="ArialMT"/>
-                <a:sym typeface="Wingdings"/>
-              </a:rPr>
-              <a:t>The probability of the posterior probability is updated with each new observation</a:t>
-            </a:r>
-          </a:p>
-          <a:p>
-            <a:pPr marL="0" marR="0" indent="0" algn="l" defTabSz="457200" rtl="0" eaLnBrk="1" fontAlgn="auto" latinLnBrk="0" hangingPunct="1">
-              <a:lnSpc>
-                <a:spcPct val="100000"/>
-              </a:lnSpc>
-              <a:spcBef>
-                <a:spcPts val="0"/>
-              </a:spcBef>
-              <a:spcAft>
-                <a:spcPts val="0"/>
-              </a:spcAft>
-              <a:buClrTx/>
-              <a:buSzTx/>
-              <a:buFontTx/>
-              <a:buNone/>
-              <a:tabLst/>
-              <a:defRPr/>
-            </a:pPr>
             <a:endParaRPr lang="en-US" sz="1200" baseline="0" dirty="0" smtClean="0">
               <a:solidFill>
                 <a:prstClr val="black"/>
@@ -2946,42 +2309,6 @@
               <a:sym typeface="Wingdings"/>
             </a:endParaRPr>
           </a:p>
-          <a:p>
-            <a:pPr marL="0" marR="0" indent="0" algn="l" defTabSz="457200" rtl="0" eaLnBrk="1" fontAlgn="auto" latinLnBrk="0" hangingPunct="1">
-              <a:lnSpc>
-                <a:spcPct val="100000"/>
-              </a:lnSpc>
-              <a:spcBef>
-                <a:spcPts val="0"/>
-              </a:spcBef>
-              <a:spcAft>
-                <a:spcPts val="0"/>
-              </a:spcAft>
-              <a:buClrTx/>
-              <a:buSzTx/>
-              <a:buFontTx/>
-              <a:buNone/>
-              <a:tabLst/>
-              <a:defRPr/>
-            </a:pPr>
-            <a:r>
-              <a:rPr lang="en-US" sz="1200" baseline="0" dirty="0" smtClean="0">
-                <a:solidFill>
-                  <a:prstClr val="black"/>
-                </a:solidFill>
-                <a:latin typeface="ArialMT"/>
-                <a:sym typeface="Wingdings"/>
-              </a:rPr>
-              <a:t>A and B change to being “belonging to a class” and “data”</a:t>
-            </a:r>
-            <a:endParaRPr lang="en-US" sz="1200" baseline="0" dirty="0" smtClean="0">
-              <a:solidFill>
-                <a:prstClr val="black"/>
-              </a:solidFill>
-              <a:latin typeface="ArialMT"/>
-              <a:sym typeface="Wingdings"/>
-            </a:endParaRPr>
-          </a:p>
         </p:txBody>
       </p:sp>
       <p:sp>
@@ -3001,7 +2328,7 @@
           <a:p>
             <a:fld id="{ADD4B5B7-85EF-4E48-AC80-2380FACD9C23}" type="slidenum">
               <a:rPr lang="en-US" smtClean="0"/>
-              <a:t>27</a:t>
+              <a:t>28</a:t>
             </a:fld>
             <a:endParaRPr lang="en-US"/>
           </a:p>
@@ -3108,7 +2435,7 @@
           <a:p>
             <a:fld id="{ADD4B5B7-85EF-4E48-AC80-2380FACD9C23}" type="slidenum">
               <a:rPr lang="en-US" smtClean="0"/>
-              <a:t>28</a:t>
+              <a:t>29</a:t>
             </a:fld>
             <a:endParaRPr lang="en-US"/>
           </a:p>
@@ -3117,7 +2444,7 @@
     </p:spTree>
     <p:extLst>
       <p:ext uri="{BB962C8B-B14F-4D97-AF65-F5344CB8AC3E}">
-        <p14:creationId xmlns:p14="http://schemas.microsoft.com/office/powerpoint/2010/main" val="645762702"/>
+        <p14:creationId xmlns:p14="http://schemas.microsoft.com/office/powerpoint/2010/main" val="1827336327"/>
       </p:ext>
     </p:extLst>
   </p:cSld>
@@ -3215,7 +2542,7 @@
           <a:p>
             <a:fld id="{ADD4B5B7-85EF-4E48-AC80-2380FACD9C23}" type="slidenum">
               <a:rPr lang="en-US" smtClean="0"/>
-              <a:t>29</a:t>
+              <a:t>30</a:t>
             </a:fld>
             <a:endParaRPr lang="en-US"/>
           </a:p>
@@ -3224,7 +2551,7 @@
     </p:spTree>
     <p:extLst>
       <p:ext uri="{BB962C8B-B14F-4D97-AF65-F5344CB8AC3E}">
-        <p14:creationId xmlns:p14="http://schemas.microsoft.com/office/powerpoint/2010/main" val="1827336327"/>
+        <p14:creationId xmlns:p14="http://schemas.microsoft.com/office/powerpoint/2010/main" val="645762702"/>
       </p:ext>
     </p:extLst>
   </p:cSld>
@@ -3322,7 +2649,7 @@
           <a:p>
             <a:fld id="{ADD4B5B7-85EF-4E48-AC80-2380FACD9C23}" type="slidenum">
               <a:rPr lang="en-US" smtClean="0"/>
-              <a:t>30</a:t>
+              <a:t>31</a:t>
             </a:fld>
             <a:endParaRPr lang="en-US"/>
           </a:p>
@@ -3385,30 +2712,7 @@
           <a:bodyPr/>
           <a:lstStyle/>
           <a:p>
-            <a:pPr marL="0" marR="0" indent="0" algn="l" defTabSz="457200" rtl="0" eaLnBrk="1" fontAlgn="auto" latinLnBrk="0" hangingPunct="1">
-              <a:lnSpc>
-                <a:spcPct val="100000"/>
-              </a:lnSpc>
-              <a:spcBef>
-                <a:spcPts val="0"/>
-              </a:spcBef>
-              <a:spcAft>
-                <a:spcPts val="0"/>
-              </a:spcAft>
-              <a:buClrTx/>
-              <a:buSzTx/>
-              <a:buFontTx/>
-              <a:buNone/>
-              <a:tabLst/>
-              <a:defRPr/>
-            </a:pPr>
-            <a:endParaRPr lang="en-US" sz="1200" baseline="0" dirty="0" smtClean="0">
-              <a:solidFill>
-                <a:prstClr val="black"/>
-              </a:solidFill>
-              <a:latin typeface="ArialMT"/>
-              <a:sym typeface="Wingdings"/>
-            </a:endParaRPr>
+            <a:endParaRPr lang="en-US" dirty="0"/>
           </a:p>
         </p:txBody>
       </p:sp>
@@ -3429,7 +2733,7 @@
           <a:p>
             <a:fld id="{ADD4B5B7-85EF-4E48-AC80-2380FACD9C23}" type="slidenum">
               <a:rPr lang="en-US" smtClean="0"/>
-              <a:t>31</a:t>
+              <a:t>32</a:t>
             </a:fld>
             <a:endParaRPr lang="en-US"/>
           </a:p>
@@ -3438,7 +2742,7 @@
     </p:spTree>
     <p:extLst>
       <p:ext uri="{BB962C8B-B14F-4D97-AF65-F5344CB8AC3E}">
-        <p14:creationId xmlns:p14="http://schemas.microsoft.com/office/powerpoint/2010/main" val="645762702"/>
+        <p14:creationId xmlns:p14="http://schemas.microsoft.com/office/powerpoint/2010/main" val="1432114613"/>
       </p:ext>
     </p:extLst>
   </p:cSld>
@@ -3492,7 +2796,30 @@
           <a:bodyPr/>
           <a:lstStyle/>
           <a:p>
-            <a:endParaRPr lang="en-US" dirty="0"/>
+            <a:pPr marL="0" marR="0" indent="0" algn="l" defTabSz="457200" rtl="0" eaLnBrk="1" fontAlgn="auto" latinLnBrk="0" hangingPunct="1">
+              <a:lnSpc>
+                <a:spcPct val="100000"/>
+              </a:lnSpc>
+              <a:spcBef>
+                <a:spcPts val="0"/>
+              </a:spcBef>
+              <a:spcAft>
+                <a:spcPts val="0"/>
+              </a:spcAft>
+              <a:buClrTx/>
+              <a:buSzTx/>
+              <a:buFontTx/>
+              <a:buNone/>
+              <a:tabLst/>
+              <a:defRPr/>
+            </a:pPr>
+            <a:endParaRPr lang="en-US" sz="1200" baseline="0" dirty="0" smtClean="0">
+              <a:solidFill>
+                <a:prstClr val="black"/>
+              </a:solidFill>
+              <a:latin typeface="ArialMT"/>
+              <a:sym typeface="Wingdings"/>
+            </a:endParaRPr>
           </a:p>
         </p:txBody>
       </p:sp>
@@ -3513,7 +2840,7 @@
           <a:p>
             <a:fld id="{ADD4B5B7-85EF-4E48-AC80-2380FACD9C23}" type="slidenum">
               <a:rPr lang="en-US" smtClean="0"/>
-              <a:t>32</a:t>
+              <a:t>33</a:t>
             </a:fld>
             <a:endParaRPr lang="en-US"/>
           </a:p>
@@ -3522,7 +2849,7 @@
     </p:spTree>
     <p:extLst>
       <p:ext uri="{BB962C8B-B14F-4D97-AF65-F5344CB8AC3E}">
-        <p14:creationId xmlns:p14="http://schemas.microsoft.com/office/powerpoint/2010/main" val="1432114613"/>
+        <p14:creationId xmlns:p14="http://schemas.microsoft.com/office/powerpoint/2010/main" val="289700723"/>
       </p:ext>
     </p:extLst>
   </p:cSld>
@@ -3704,7 +3031,7 @@
           <a:p>
             <a:fld id="{ADD4B5B7-85EF-4E48-AC80-2380FACD9C23}" type="slidenum">
               <a:rPr lang="en-US" smtClean="0"/>
-              <a:t>33</a:t>
+              <a:t>34</a:t>
             </a:fld>
             <a:endParaRPr lang="en-US"/>
           </a:p>
@@ -3713,7 +3040,7 @@
     </p:spTree>
     <p:extLst>
       <p:ext uri="{BB962C8B-B14F-4D97-AF65-F5344CB8AC3E}">
-        <p14:creationId xmlns:p14="http://schemas.microsoft.com/office/powerpoint/2010/main" val="289700723"/>
+        <p14:creationId xmlns:p14="http://schemas.microsoft.com/office/powerpoint/2010/main" val="168002245"/>
       </p:ext>
     </p:extLst>
   </p:cSld>
@@ -3811,7 +3138,7 @@
           <a:p>
             <a:fld id="{ADD4B5B7-85EF-4E48-AC80-2380FACD9C23}" type="slidenum">
               <a:rPr lang="en-US" smtClean="0"/>
-              <a:t>34</a:t>
+              <a:t>35</a:t>
             </a:fld>
             <a:endParaRPr lang="en-US"/>
           </a:p>
@@ -3820,7 +3147,7 @@
     </p:spTree>
     <p:extLst>
       <p:ext uri="{BB962C8B-B14F-4D97-AF65-F5344CB8AC3E}">
-        <p14:creationId xmlns:p14="http://schemas.microsoft.com/office/powerpoint/2010/main" val="168002245"/>
+        <p14:creationId xmlns:p14="http://schemas.microsoft.com/office/powerpoint/2010/main" val="439493451"/>
       </p:ext>
     </p:extLst>
   </p:cSld>
@@ -3918,113 +3245,6 @@
           <a:p>
             <a:fld id="{ADD4B5B7-85EF-4E48-AC80-2380FACD9C23}" type="slidenum">
               <a:rPr lang="en-US" smtClean="0"/>
-              <a:t>35</a:t>
-            </a:fld>
-            <a:endParaRPr lang="en-US"/>
-          </a:p>
-        </p:txBody>
-      </p:sp>
-    </p:spTree>
-    <p:extLst>
-      <p:ext uri="{BB962C8B-B14F-4D97-AF65-F5344CB8AC3E}">
-        <p14:creationId xmlns:p14="http://schemas.microsoft.com/office/powerpoint/2010/main" val="439493451"/>
-      </p:ext>
-    </p:extLst>
-  </p:cSld>
-  <p:clrMapOvr>
-    <a:masterClrMapping/>
-  </p:clrMapOvr>
-</p:notes>
-</file>
-
-<file path=ppt/notesSlides/notesSlide33.xml><?xml version="1.0" encoding="utf-8"?>
-<p:notes xmlns:a="http://schemas.openxmlformats.org/drawingml/2006/main" xmlns:r="http://schemas.openxmlformats.org/officeDocument/2006/relationships" xmlns:p="http://schemas.openxmlformats.org/presentationml/2006/main">
-  <p:cSld>
-    <p:spTree>
-      <p:nvGrpSpPr>
-        <p:cNvPr id="1" name=""/>
-        <p:cNvGrpSpPr/>
-        <p:nvPr/>
-      </p:nvGrpSpPr>
-      <p:grpSpPr>
-        <a:xfrm>
-          <a:off x="0" y="0"/>
-          <a:ext cx="0" cy="0"/>
-          <a:chOff x="0" y="0"/>
-          <a:chExt cx="0" cy="0"/>
-        </a:xfrm>
-      </p:grpSpPr>
-      <p:sp>
-        <p:nvSpPr>
-          <p:cNvPr id="2" name="Slide Image Placeholder 1"/>
-          <p:cNvSpPr>
-            <a:spLocks noGrp="1" noRot="1" noChangeAspect="1"/>
-          </p:cNvSpPr>
-          <p:nvPr>
-            <p:ph type="sldImg"/>
-          </p:nvPr>
-        </p:nvSpPr>
-        <p:spPr/>
-      </p:sp>
-      <p:sp>
-        <p:nvSpPr>
-          <p:cNvPr id="3" name="Notes Placeholder 2"/>
-          <p:cNvSpPr>
-            <a:spLocks noGrp="1"/>
-          </p:cNvSpPr>
-          <p:nvPr>
-            <p:ph type="body" idx="1"/>
-          </p:nvPr>
-        </p:nvSpPr>
-        <p:spPr/>
-        <p:txBody>
-          <a:bodyPr/>
-          <a:lstStyle/>
-          <a:p>
-            <a:pPr marL="0" marR="0" indent="0" algn="l" defTabSz="457200" rtl="0" eaLnBrk="1" fontAlgn="auto" latinLnBrk="0" hangingPunct="1">
-              <a:lnSpc>
-                <a:spcPct val="100000"/>
-              </a:lnSpc>
-              <a:spcBef>
-                <a:spcPts val="0"/>
-              </a:spcBef>
-              <a:spcAft>
-                <a:spcPts val="0"/>
-              </a:spcAft>
-              <a:buClrTx/>
-              <a:buSzTx/>
-              <a:buFontTx/>
-              <a:buNone/>
-              <a:tabLst/>
-              <a:defRPr/>
-            </a:pPr>
-            <a:endParaRPr lang="en-US" sz="1200" baseline="0" dirty="0" smtClean="0">
-              <a:solidFill>
-                <a:prstClr val="black"/>
-              </a:solidFill>
-              <a:latin typeface="ArialMT"/>
-              <a:sym typeface="Wingdings"/>
-            </a:endParaRPr>
-          </a:p>
-        </p:txBody>
-      </p:sp>
-      <p:sp>
-        <p:nvSpPr>
-          <p:cNvPr id="4" name="Slide Number Placeholder 3"/>
-          <p:cNvSpPr>
-            <a:spLocks noGrp="1"/>
-          </p:cNvSpPr>
-          <p:nvPr>
-            <p:ph type="sldNum" sz="quarter" idx="10"/>
-          </p:nvPr>
-        </p:nvSpPr>
-        <p:spPr/>
-        <p:txBody>
-          <a:bodyPr/>
-          <a:lstStyle/>
-          <a:p>
-            <a:fld id="{ADD4B5B7-85EF-4E48-AC80-2380FACD9C23}" type="slidenum">
-              <a:rPr lang="en-US" smtClean="0"/>
               <a:t>36</a:t>
             </a:fld>
             <a:endParaRPr lang="en-US"/>
@@ -4044,7 +3264,7 @@
 </p:notes>
 </file>
 
-<file path=ppt/notesSlides/notesSlide34.xml><?xml version="1.0" encoding="utf-8"?>
+<file path=ppt/notesSlides/notesSlide33.xml><?xml version="1.0" encoding="utf-8"?>
 <p:notes xmlns:a="http://schemas.openxmlformats.org/drawingml/2006/main" xmlns:r="http://schemas.openxmlformats.org/officeDocument/2006/relationships" xmlns:p="http://schemas.openxmlformats.org/presentationml/2006/main">
   <p:cSld>
     <p:spTree>
@@ -4640,16 +3860,6 @@
               <a:tabLst/>
               <a:defRPr/>
             </a:pPr>
-            <a:r>
-              <a:rPr lang="en-US" sz="1200" baseline="0" dirty="0" smtClean="0">
-                <a:solidFill>
-                  <a:prstClr val="black"/>
-                </a:solidFill>
-                <a:latin typeface="ArialMT"/>
-                <a:sym typeface="Wingdings"/>
-              </a:rPr>
-              <a:t>Complement of an event is the opposite</a:t>
-            </a:r>
             <a:endParaRPr lang="en-US" sz="1200" baseline="0" dirty="0" smtClean="0">
               <a:solidFill>
                 <a:prstClr val="black"/>
@@ -4855,14 +4065,14 @@
           </a:ln>
           <a:extLst>
             <a:ext uri="{909E8E84-426E-40dd-AFC4-6F175D3DCCD1}">
-              <a14:hiddenFill xmlns:a14="http://schemas.microsoft.com/office/drawing/2010/main">
+              <a14:hiddenFill xmlns:a14="http://schemas.microsoft.com/office/drawing/2010/main" xmlns="">
                 <a:solidFill>
                   <a:srgbClr val="FFFFFF"/>
                 </a:solidFill>
               </a14:hiddenFill>
             </a:ext>
             <a:ext uri="{91240B29-F687-4f45-9708-019B960494DF}">
-              <a14:hiddenLine xmlns:a14="http://schemas.microsoft.com/office/drawing/2010/main" w="12700">
+              <a14:hiddenLine xmlns:a14="http://schemas.microsoft.com/office/drawing/2010/main" xmlns="" w="12700">
                 <a:solidFill>
                   <a:srgbClr val="000000"/>
                 </a:solidFill>
@@ -4993,7 +4203,7 @@
   <p:clrMapOvr>
     <a:masterClrMapping/>
   </p:clrMapOvr>
-  <p:transition xmlns:p14="http://schemas.microsoft.com/office/powerpoint/2010/main"/>
+  <p:transition/>
 </p:sldLayout>
 </file>
 
@@ -5043,7 +4253,7 @@
           <a:effectLst/>
           <a:extLst>
             <a:ext uri="{AF507438-7753-43e0-B8FC-AC1667EBCBE1}">
-              <a14:hiddenEffects xmlns:a14="http://schemas.microsoft.com/office/drawing/2010/main">
+              <a14:hiddenEffects xmlns:a14="http://schemas.microsoft.com/office/drawing/2010/main" xmlns="">
                 <a:effectLst>
                   <a:outerShdw blurRad="63500" dist="38099" dir="2700000" algn="ctr" rotWithShape="0">
                     <a:schemeClr val="bg2">
@@ -5085,7 +4295,7 @@
           <a:effectLst/>
           <a:extLst>
             <a:ext uri="{AF507438-7753-43e0-B8FC-AC1667EBCBE1}">
-              <a14:hiddenEffects xmlns:a14="http://schemas.microsoft.com/office/drawing/2010/main">
+              <a14:hiddenEffects xmlns:a14="http://schemas.microsoft.com/office/drawing/2010/main" xmlns="">
                 <a:effectLst>
                   <a:outerShdw blurRad="63500" dist="38099" dir="2700000" algn="ctr" rotWithShape="0">
                     <a:schemeClr val="bg2">
@@ -5127,7 +4337,7 @@
           <a:effectLst/>
           <a:extLst>
             <a:ext uri="{AF507438-7753-43e0-B8FC-AC1667EBCBE1}">
-              <a14:hiddenEffects xmlns:a14="http://schemas.microsoft.com/office/drawing/2010/main">
+              <a14:hiddenEffects xmlns:a14="http://schemas.microsoft.com/office/drawing/2010/main" xmlns="">
                 <a:effectLst>
                   <a:outerShdw blurRad="63500" dist="38099" dir="2700000" algn="ctr" rotWithShape="0">
                     <a:schemeClr val="bg2">
@@ -5169,7 +4379,7 @@
           <a:effectLst/>
           <a:extLst>
             <a:ext uri="{AF507438-7753-43e0-B8FC-AC1667EBCBE1}">
-              <a14:hiddenEffects xmlns:a14="http://schemas.microsoft.com/office/drawing/2010/main">
+              <a14:hiddenEffects xmlns:a14="http://schemas.microsoft.com/office/drawing/2010/main" xmlns="">
                 <a:effectLst>
                   <a:outerShdw blurRad="63500" dist="38099" dir="2700000" algn="ctr" rotWithShape="0">
                     <a:schemeClr val="bg2">
@@ -5948,7 +5158,7 @@
   <p:clrMapOvr>
     <a:masterClrMapping/>
   </p:clrMapOvr>
-  <p:transition xmlns:p14="http://schemas.microsoft.com/office/powerpoint/2010/main"/>
+  <p:transition/>
 </p:sldLayout>
 </file>
 
@@ -5998,7 +5208,7 @@
           <a:effectLst/>
           <a:extLst>
             <a:ext uri="{AF507438-7753-43e0-B8FC-AC1667EBCBE1}">
-              <a14:hiddenEffects xmlns:a14="http://schemas.microsoft.com/office/drawing/2010/main">
+              <a14:hiddenEffects xmlns:a14="http://schemas.microsoft.com/office/drawing/2010/main" xmlns="">
                 <a:effectLst>
                   <a:outerShdw blurRad="63500" dist="38099" dir="2700000" algn="ctr" rotWithShape="0">
                     <a:schemeClr val="bg2">
@@ -6040,7 +5250,7 @@
           <a:effectLst/>
           <a:extLst>
             <a:ext uri="{AF507438-7753-43e0-B8FC-AC1667EBCBE1}">
-              <a14:hiddenEffects xmlns:a14="http://schemas.microsoft.com/office/drawing/2010/main">
+              <a14:hiddenEffects xmlns:a14="http://schemas.microsoft.com/office/drawing/2010/main" xmlns="">
                 <a:effectLst>
                   <a:outerShdw blurRad="63500" dist="38099" dir="2700000" algn="ctr" rotWithShape="0">
                     <a:schemeClr val="bg2">
@@ -6505,7 +5715,7 @@
   <p:clrMapOvr>
     <a:masterClrMapping/>
   </p:clrMapOvr>
-  <p:transition xmlns:p14="http://schemas.microsoft.com/office/powerpoint/2010/main"/>
+  <p:transition/>
 </p:sldLayout>
 </file>
 
@@ -6805,7 +6015,7 @@
   <p:clrMapOvr>
     <a:masterClrMapping/>
   </p:clrMapOvr>
-  <p:transition xmlns:p14="http://schemas.microsoft.com/office/powerpoint/2010/main"/>
+  <p:transition/>
 </p:sldLayout>
 </file>
 
@@ -6942,7 +6152,7 @@
   <p:clrMapOvr>
     <a:masterClrMapping/>
   </p:clrMapOvr>
-  <p:transition xmlns:p14="http://schemas.microsoft.com/office/powerpoint/2010/main"/>
+  <p:transition/>
 </p:sldLayout>
 </file>
 
@@ -7109,7 +6319,7 @@
   <p:clrMapOvr>
     <a:masterClrMapping/>
   </p:clrMapOvr>
-  <p:transition xmlns:p14="http://schemas.microsoft.com/office/powerpoint/2010/main"/>
+  <p:transition/>
 </p:sldLayout>
 </file>
 
@@ -7175,7 +6385,7 @@
   <p:clrMapOvr>
     <a:masterClrMapping/>
   </p:clrMapOvr>
-  <p:transition xmlns:p14="http://schemas.microsoft.com/office/powerpoint/2010/main"/>
+  <p:transition/>
 </p:sldLayout>
 </file>
 
@@ -7407,7 +6617,7 @@
   <p:clrMapOvr>
     <a:masterClrMapping/>
   </p:clrMapOvr>
-  <p:transition xmlns:p14="http://schemas.microsoft.com/office/powerpoint/2010/main"/>
+  <p:transition/>
 </p:sldLayout>
 </file>
 
@@ -7674,7 +6884,7 @@
   <p:clrMapOvr>
     <a:masterClrMapping/>
   </p:clrMapOvr>
-  <p:transition xmlns:p14="http://schemas.microsoft.com/office/powerpoint/2010/main"/>
+  <p:transition/>
 </p:sldLayout>
 </file>
 
@@ -7943,7 +7153,7 @@
   <p:clrMapOvr>
     <a:masterClrMapping/>
   </p:clrMapOvr>
-  <p:transition xmlns:p14="http://schemas.microsoft.com/office/powerpoint/2010/main"/>
+  <p:transition/>
 </p:sldLayout>
 </file>
 
@@ -7991,7 +7201,7 @@
           </a:ln>
           <a:extLst>
             <a:ext uri="{909E8E84-426E-40dd-AFC4-6F175D3DCCD1}">
-              <a14:hiddenFill xmlns:a14="http://schemas.microsoft.com/office/drawing/2010/main">
+              <a14:hiddenFill xmlns:a14="http://schemas.microsoft.com/office/drawing/2010/main" xmlns="">
                 <a:noFill/>
               </a14:hiddenFill>
             </a:ext>
@@ -8032,7 +7242,7 @@
           </a:ln>
           <a:extLst>
             <a:ext uri="{909E8E84-426E-40dd-AFC4-6F175D3DCCD1}">
-              <a14:hiddenFill xmlns:a14="http://schemas.microsoft.com/office/drawing/2010/main">
+              <a14:hiddenFill xmlns:a14="http://schemas.microsoft.com/office/drawing/2010/main" xmlns="">
                 <a:noFill/>
               </a14:hiddenFill>
             </a:ext>
@@ -8259,7 +7469,7 @@
   <p:clrMapOvr>
     <a:masterClrMapping/>
   </p:clrMapOvr>
-  <p:transition xmlns:p14="http://schemas.microsoft.com/office/powerpoint/2010/main"/>
+  <p:transition/>
 </p:sldLayout>
 </file>
 
@@ -8307,7 +7517,7 @@
           </a:ln>
           <a:extLst>
             <a:ext uri="{909E8E84-426E-40dd-AFC4-6F175D3DCCD1}">
-              <a14:hiddenFill xmlns:a14="http://schemas.microsoft.com/office/drawing/2010/main">
+              <a14:hiddenFill xmlns:a14="http://schemas.microsoft.com/office/drawing/2010/main" xmlns="">
                 <a:noFill/>
               </a14:hiddenFill>
             </a:ext>
@@ -8348,7 +7558,7 @@
           </a:ln>
           <a:extLst>
             <a:ext uri="{909E8E84-426E-40dd-AFC4-6F175D3DCCD1}">
-              <a14:hiddenFill xmlns:a14="http://schemas.microsoft.com/office/drawing/2010/main">
+              <a14:hiddenFill xmlns:a14="http://schemas.microsoft.com/office/drawing/2010/main" xmlns="">
                 <a:noFill/>
               </a14:hiddenFill>
             </a:ext>
@@ -8397,14 +7607,14 @@
           </a:ln>
           <a:extLst>
             <a:ext uri="{909E8E84-426E-40dd-AFC4-6F175D3DCCD1}">
-              <a14:hiddenFill xmlns:a14="http://schemas.microsoft.com/office/drawing/2010/main">
+              <a14:hiddenFill xmlns:a14="http://schemas.microsoft.com/office/drawing/2010/main" xmlns="">
                 <a:solidFill>
                   <a:srgbClr val="FFFFFF"/>
                 </a:solidFill>
               </a14:hiddenFill>
             </a:ext>
             <a:ext uri="{91240B29-F687-4f45-9708-019B960494DF}">
-              <a14:hiddenLine xmlns:a14="http://schemas.microsoft.com/office/drawing/2010/main" w="9525">
+              <a14:hiddenLine xmlns:a14="http://schemas.microsoft.com/office/drawing/2010/main" xmlns="" w="9525">
                 <a:solidFill>
                   <a:srgbClr val="000000"/>
                 </a:solidFill>
@@ -8602,7 +7812,7 @@
   <p:clrMapOvr>
     <a:masterClrMapping/>
   </p:clrMapOvr>
-  <p:transition xmlns:p14="http://schemas.microsoft.com/office/powerpoint/2010/main"/>
+  <p:transition/>
 </p:sldLayout>
 </file>
 
@@ -8658,14 +7868,14 @@
           </a:ln>
           <a:extLst>
             <a:ext uri="{909E8E84-426E-40dd-AFC4-6F175D3DCCD1}">
-              <a14:hiddenFill xmlns:a14="http://schemas.microsoft.com/office/drawing/2010/main">
+              <a14:hiddenFill xmlns:a14="http://schemas.microsoft.com/office/drawing/2010/main" xmlns="">
                 <a:solidFill>
                   <a:srgbClr val="FFFFFF"/>
                 </a:solidFill>
               </a14:hiddenFill>
             </a:ext>
             <a:ext uri="{91240B29-F687-4f45-9708-019B960494DF}">
-              <a14:hiddenLine xmlns:a14="http://schemas.microsoft.com/office/drawing/2010/main" w="9525">
+              <a14:hiddenLine xmlns:a14="http://schemas.microsoft.com/office/drawing/2010/main" xmlns="" w="9525">
                 <a:solidFill>
                   <a:srgbClr val="000000"/>
                 </a:solidFill>
@@ -8704,7 +7914,7 @@
           </a:ln>
           <a:extLst>
             <a:ext uri="{909E8E84-426E-40dd-AFC4-6F175D3DCCD1}">
-              <a14:hiddenFill xmlns:a14="http://schemas.microsoft.com/office/drawing/2010/main">
+              <a14:hiddenFill xmlns:a14="http://schemas.microsoft.com/office/drawing/2010/main" xmlns="">
                 <a:noFill/>
               </a14:hiddenFill>
             </a:ext>
@@ -8745,7 +7955,7 @@
           </a:ln>
           <a:extLst>
             <a:ext uri="{909E8E84-426E-40dd-AFC4-6F175D3DCCD1}">
-              <a14:hiddenFill xmlns:a14="http://schemas.microsoft.com/office/drawing/2010/main">
+              <a14:hiddenFill xmlns:a14="http://schemas.microsoft.com/office/drawing/2010/main" xmlns="">
                 <a:noFill/>
               </a14:hiddenFill>
             </a:ext>
@@ -8945,7 +8155,7 @@
   <p:clrMapOvr>
     <a:masterClrMapping/>
   </p:clrMapOvr>
-  <p:transition xmlns:p14="http://schemas.microsoft.com/office/powerpoint/2010/main"/>
+  <p:transition/>
 </p:sldLayout>
 </file>
 
@@ -9001,14 +8211,14 @@
           </a:ln>
           <a:extLst>
             <a:ext uri="{909E8E84-426E-40dd-AFC4-6F175D3DCCD1}">
-              <a14:hiddenFill xmlns:a14="http://schemas.microsoft.com/office/drawing/2010/main">
+              <a14:hiddenFill xmlns:a14="http://schemas.microsoft.com/office/drawing/2010/main" xmlns="">
                 <a:solidFill>
                   <a:srgbClr val="FFFFFF"/>
                 </a:solidFill>
               </a14:hiddenFill>
             </a:ext>
             <a:ext uri="{91240B29-F687-4f45-9708-019B960494DF}">
-              <a14:hiddenLine xmlns:a14="http://schemas.microsoft.com/office/drawing/2010/main" w="9525">
+              <a14:hiddenLine xmlns:a14="http://schemas.microsoft.com/office/drawing/2010/main" xmlns="" w="9525">
                 <a:solidFill>
                   <a:srgbClr val="000000"/>
                 </a:solidFill>
@@ -9047,7 +8257,7 @@
           </a:ln>
           <a:extLst>
             <a:ext uri="{909E8E84-426E-40dd-AFC4-6F175D3DCCD1}">
-              <a14:hiddenFill xmlns:a14="http://schemas.microsoft.com/office/drawing/2010/main">
+              <a14:hiddenFill xmlns:a14="http://schemas.microsoft.com/office/drawing/2010/main" xmlns="">
                 <a:noFill/>
               </a14:hiddenFill>
             </a:ext>
@@ -9088,7 +8298,7 @@
           </a:ln>
           <a:extLst>
             <a:ext uri="{909E8E84-426E-40dd-AFC4-6F175D3DCCD1}">
-              <a14:hiddenFill xmlns:a14="http://schemas.microsoft.com/office/drawing/2010/main">
+              <a14:hiddenFill xmlns:a14="http://schemas.microsoft.com/office/drawing/2010/main" xmlns="">
                 <a:noFill/>
               </a14:hiddenFill>
             </a:ext>
@@ -9288,7 +8498,7 @@
   <p:clrMapOvr>
     <a:masterClrMapping/>
   </p:clrMapOvr>
-  <p:transition xmlns:p14="http://schemas.microsoft.com/office/powerpoint/2010/main"/>
+  <p:transition/>
 </p:sldLayout>
 </file>
 
@@ -9344,14 +8554,14 @@
           </a:ln>
           <a:extLst>
             <a:ext uri="{909E8E84-426E-40dd-AFC4-6F175D3DCCD1}">
-              <a14:hiddenFill xmlns:a14="http://schemas.microsoft.com/office/drawing/2010/main">
+              <a14:hiddenFill xmlns:a14="http://schemas.microsoft.com/office/drawing/2010/main" xmlns="">
                 <a:solidFill>
                   <a:srgbClr val="FFFFFF"/>
                 </a:solidFill>
               </a14:hiddenFill>
             </a:ext>
             <a:ext uri="{91240B29-F687-4f45-9708-019B960494DF}">
-              <a14:hiddenLine xmlns:a14="http://schemas.microsoft.com/office/drawing/2010/main" w="9525">
+              <a14:hiddenLine xmlns:a14="http://schemas.microsoft.com/office/drawing/2010/main" xmlns="" w="9525">
                 <a:solidFill>
                   <a:srgbClr val="000000"/>
                 </a:solidFill>
@@ -9390,7 +8600,7 @@
           </a:ln>
           <a:extLst>
             <a:ext uri="{909E8E84-426E-40dd-AFC4-6F175D3DCCD1}">
-              <a14:hiddenFill xmlns:a14="http://schemas.microsoft.com/office/drawing/2010/main">
+              <a14:hiddenFill xmlns:a14="http://schemas.microsoft.com/office/drawing/2010/main" xmlns="">
                 <a:noFill/>
               </a14:hiddenFill>
             </a:ext>
@@ -9431,7 +8641,7 @@
           </a:ln>
           <a:extLst>
             <a:ext uri="{909E8E84-426E-40dd-AFC4-6F175D3DCCD1}">
-              <a14:hiddenFill xmlns:a14="http://schemas.microsoft.com/office/drawing/2010/main">
+              <a14:hiddenFill xmlns:a14="http://schemas.microsoft.com/office/drawing/2010/main" xmlns="">
                 <a:noFill/>
               </a14:hiddenFill>
             </a:ext>
@@ -9775,7 +8985,7 @@
   <p:clrMapOvr>
     <a:masterClrMapping/>
   </p:clrMapOvr>
-  <p:transition xmlns:p14="http://schemas.microsoft.com/office/powerpoint/2010/main"/>
+  <p:transition/>
 </p:sldLayout>
 </file>
 
@@ -9831,7 +9041,7 @@
           </a:ln>
           <a:extLst>
             <a:ext uri="{909E8E84-426E-40dd-AFC4-6F175D3DCCD1}">
-              <a14:hiddenFill xmlns:a14="http://schemas.microsoft.com/office/drawing/2010/main">
+              <a14:hiddenFill xmlns:a14="http://schemas.microsoft.com/office/drawing/2010/main" xmlns="">
                 <a:noFill/>
               </a14:hiddenFill>
             </a:ext>
@@ -9872,7 +9082,7 @@
           </a:ln>
           <a:extLst>
             <a:ext uri="{909E8E84-426E-40dd-AFC4-6F175D3DCCD1}">
-              <a14:hiddenFill xmlns:a14="http://schemas.microsoft.com/office/drawing/2010/main">
+              <a14:hiddenFill xmlns:a14="http://schemas.microsoft.com/office/drawing/2010/main" xmlns="">
                 <a:noFill/>
               </a14:hiddenFill>
             </a:ext>
@@ -9893,7 +9103,7 @@
     <p:sldLayoutId id="2147484107" r:id="rId1"/>
     <p:sldLayoutId id="2147484108" r:id="rId2"/>
   </p:sldLayoutIdLst>
-  <p:transition xmlns:p14="http://schemas.microsoft.com/office/powerpoint/2010/main"/>
+  <p:transition/>
   <p:txStyles>
     <p:titleStyle>
       <a:lvl1pPr algn="l" rtl="0" eaLnBrk="1" fontAlgn="base" hangingPunct="1">
@@ -10432,14 +9642,14 @@
           <a:effectLst/>
           <a:extLst>
             <a:ext uri="{909E8E84-426E-40dd-AFC4-6F175D3DCCD1}">
-              <a14:hiddenFill xmlns:a14="http://schemas.microsoft.com/office/drawing/2010/main">
+              <a14:hiddenFill xmlns:a14="http://schemas.microsoft.com/office/drawing/2010/main" xmlns="">
                 <a:solidFill>
                   <a:srgbClr val="FFFFFF"/>
                 </a:solidFill>
               </a14:hiddenFill>
             </a:ext>
             <a:ext uri="{91240B29-F687-4f45-9708-019B960494DF}">
-              <a14:hiddenLine xmlns:a14="http://schemas.microsoft.com/office/drawing/2010/main" w="12700">
+              <a14:hiddenLine xmlns:a14="http://schemas.microsoft.com/office/drawing/2010/main" xmlns="" w="12700">
                 <a:solidFill>
                   <a:schemeClr val="tx1"/>
                 </a:solidFill>
@@ -10449,7 +9659,7 @@
               </a14:hiddenLine>
             </a:ext>
             <a:ext uri="{AF507438-7753-43e0-B8FC-AC1667EBCBE1}">
-              <a14:hiddenEffects xmlns:a14="http://schemas.microsoft.com/office/drawing/2010/main">
+              <a14:hiddenEffects xmlns:a14="http://schemas.microsoft.com/office/drawing/2010/main" xmlns="">
                 <a:effectLst>
                   <a:outerShdw blurRad="63500" dist="38099" dir="2700000" algn="ctr" rotWithShape="0">
                     <a:srgbClr val="000000">
@@ -10621,7 +9831,7 @@
           </a:ln>
           <a:extLst>
             <a:ext uri="{909E8E84-426E-40dd-AFC4-6F175D3DCCD1}">
-              <a14:hiddenFill xmlns:a14="http://schemas.microsoft.com/office/drawing/2010/main">
+              <a14:hiddenFill xmlns:a14="http://schemas.microsoft.com/office/drawing/2010/main" xmlns="">
                 <a:noFill/>
               </a14:hiddenFill>
             </a:ext>
@@ -10662,7 +9872,7 @@
           </a:ln>
           <a:extLst>
             <a:ext uri="{909E8E84-426E-40dd-AFC4-6F175D3DCCD1}">
-              <a14:hiddenFill xmlns:a14="http://schemas.microsoft.com/office/drawing/2010/main">
+              <a14:hiddenFill xmlns:a14="http://schemas.microsoft.com/office/drawing/2010/main" xmlns="">
                 <a:noFill/>
               </a14:hiddenFill>
             </a:ext>
@@ -10694,7 +9904,7 @@
     <p:sldLayoutId id="2147484105" r:id="rId12"/>
     <p:sldLayoutId id="2147484106" r:id="rId13"/>
   </p:sldLayoutIdLst>
-  <p:transition xmlns:p14="http://schemas.microsoft.com/office/powerpoint/2010/main"/>
+  <p:transition/>
   <p:hf hdr="0" ftr="0" dt="0"/>
   <p:txStyles>
     <p:titleStyle>
@@ -11244,7 +10454,11 @@
             </a:r>
             <a:r>
               <a:rPr lang="en-US" sz="5000" dirty="0" smtClean="0"/>
-              <a:t> classification and roc/</a:t>
+              <a:t> </a:t>
+            </a:r>
+            <a:r>
+              <a:rPr lang="en-US" sz="5000" dirty="0" smtClean="0"/>
+              <a:t>classification and roc/</a:t>
             </a:r>
             <a:r>
               <a:rPr lang="en-US" sz="5000" dirty="0" err="1" smtClean="0"/>
@@ -11263,11 +10477,11 @@
   <p:clrMapOvr>
     <a:masterClrMapping/>
   </p:clrMapOvr>
-  <p:transition xmlns:p14="http://schemas.microsoft.com/office/powerpoint/2010/main"/>
+  <p:transition/>
   <p:timing>
     <p:tnLst>
       <p:par>
-        <p:cTn xmlns:p14="http://schemas.microsoft.com/office/powerpoint/2010/main" id="1" dur="indefinite" restart="never" nodeType="tmRoot"/>
+        <p:cTn id="1" dur="indefinite" restart="never" nodeType="tmRoot"/>
       </p:par>
     </p:tnLst>
   </p:timing>
@@ -11389,14 +10603,14 @@
           </a:ln>
           <a:extLst>
             <a:ext uri="{909E8E84-426E-40dd-AFC4-6F175D3DCCD1}">
-              <a14:hiddenFill xmlns:a14="http://schemas.microsoft.com/office/drawing/2010/main">
+              <a14:hiddenFill xmlns:a14="http://schemas.microsoft.com/office/drawing/2010/main" xmlns="">
                 <a:solidFill>
                   <a:schemeClr val="accent1"/>
                 </a:solidFill>
               </a14:hiddenFill>
             </a:ext>
             <a:ext uri="{91240B29-F687-4f45-9708-019B960494DF}">
-              <a14:hiddenLine xmlns:a14="http://schemas.microsoft.com/office/drawing/2010/main" w="9525">
+              <a14:hiddenLine xmlns:a14="http://schemas.microsoft.com/office/drawing/2010/main" xmlns="" w="9525">
                 <a:solidFill>
                   <a:schemeClr val="tx1"/>
                 </a:solidFill>
@@ -11515,11 +10729,11 @@
   <p:clrMapOvr>
     <a:masterClrMapping/>
   </p:clrMapOvr>
-  <p:transition xmlns:p14="http://schemas.microsoft.com/office/powerpoint/2010/main"/>
+  <p:transition/>
   <p:timing>
     <p:tnLst>
       <p:par>
-        <p:cTn xmlns:p14="http://schemas.microsoft.com/office/powerpoint/2010/main" id="1" dur="indefinite" restart="never" nodeType="tmRoot">
+        <p:cTn id="1" dur="indefinite" restart="never" nodeType="tmRoot">
           <p:childTnLst>
             <p:seq concurrent="1" nextAc="seek">
               <p:cTn id="2" dur="indefinite" nodeType="mainSeq">
@@ -11958,14 +11172,14 @@
           </a:ln>
           <a:extLst>
             <a:ext uri="{909E8E84-426E-40dd-AFC4-6F175D3DCCD1}">
-              <a14:hiddenFill xmlns:a14="http://schemas.microsoft.com/office/drawing/2010/main">
+              <a14:hiddenFill xmlns:a14="http://schemas.microsoft.com/office/drawing/2010/main" xmlns="">
                 <a:solidFill>
                   <a:schemeClr val="accent1"/>
                 </a:solidFill>
               </a14:hiddenFill>
             </a:ext>
             <a:ext uri="{91240B29-F687-4f45-9708-019B960494DF}">
-              <a14:hiddenLine xmlns:a14="http://schemas.microsoft.com/office/drawing/2010/main" w="9525">
+              <a14:hiddenLine xmlns:a14="http://schemas.microsoft.com/office/drawing/2010/main" xmlns="" w="9525">
                 <a:solidFill>
                   <a:schemeClr val="tx1"/>
                 </a:solidFill>
@@ -12160,7 +11374,7 @@
           <a:effectLst/>
           <a:extLst>
             <a:ext uri="{AF507438-7753-43e0-B8FC-AC1667EBCBE1}">
-              <a14:hiddenEffects xmlns:a14="http://schemas.microsoft.com/office/drawing/2010/main">
+              <a14:hiddenEffects xmlns:a14="http://schemas.microsoft.com/office/drawing/2010/main" xmlns="">
                 <a:effectLst>
                   <a:outerShdw blurRad="63500" dist="38099" dir="2700000" algn="ctr" rotWithShape="0">
                     <a:schemeClr val="bg2">
@@ -12202,7 +11416,7 @@
           <a:effectLst/>
           <a:extLst>
             <a:ext uri="{AF507438-7753-43e0-B8FC-AC1667EBCBE1}">
-              <a14:hiddenEffects xmlns:a14="http://schemas.microsoft.com/office/drawing/2010/main">
+              <a14:hiddenEffects xmlns:a14="http://schemas.microsoft.com/office/drawing/2010/main" xmlns="">
                 <a:effectLst>
                   <a:outerShdw blurRad="63500" dist="38099" dir="2700000" algn="ctr" rotWithShape="0">
                     <a:schemeClr val="bg2">
@@ -12244,7 +11458,7 @@
           <a:effectLst/>
           <a:extLst>
             <a:ext uri="{AF507438-7753-43e0-B8FC-AC1667EBCBE1}">
-              <a14:hiddenEffects xmlns:a14="http://schemas.microsoft.com/office/drawing/2010/main">
+              <a14:hiddenEffects xmlns:a14="http://schemas.microsoft.com/office/drawing/2010/main" xmlns="">
                 <a:effectLst>
                   <a:outerShdw blurRad="63500" dist="38099" dir="2700000" algn="ctr" rotWithShape="0">
                     <a:schemeClr val="bg2">
@@ -12292,14 +11506,14 @@
           </a:ln>
           <a:extLst>
             <a:ext uri="{909E8E84-426E-40dd-AFC4-6F175D3DCCD1}">
-              <a14:hiddenFill xmlns:a14="http://schemas.microsoft.com/office/drawing/2010/main">
+              <a14:hiddenFill xmlns:a14="http://schemas.microsoft.com/office/drawing/2010/main" xmlns="">
                 <a:solidFill>
                   <a:schemeClr val="accent1"/>
                 </a:solidFill>
               </a14:hiddenFill>
             </a:ext>
             <a:ext uri="{91240B29-F687-4f45-9708-019B960494DF}">
-              <a14:hiddenLine xmlns:a14="http://schemas.microsoft.com/office/drawing/2010/main" w="9525">
+              <a14:hiddenLine xmlns:a14="http://schemas.microsoft.com/office/drawing/2010/main" xmlns="" w="9525">
                 <a:solidFill>
                   <a:schemeClr val="tx1"/>
                 </a:solidFill>
@@ -12321,11 +11535,11 @@
   <p:clrMapOvr>
     <a:masterClrMapping/>
   </p:clrMapOvr>
-  <p:transition xmlns:p14="http://schemas.microsoft.com/office/powerpoint/2010/main"/>
+  <p:transition/>
   <p:timing>
     <p:tnLst>
       <p:par>
-        <p:cTn xmlns:p14="http://schemas.microsoft.com/office/powerpoint/2010/main" id="1" dur="indefinite" restart="never" nodeType="tmRoot">
+        <p:cTn id="1" dur="indefinite" restart="never" nodeType="tmRoot">
           <p:childTnLst>
             <p:seq concurrent="1" nextAc="seek">
               <p:cTn id="2" dur="indefinite" nodeType="mainSeq">
@@ -12785,14 +11999,14 @@
           </a:ln>
           <a:extLst>
             <a:ext uri="{909E8E84-426E-40dd-AFC4-6F175D3DCCD1}">
-              <a14:hiddenFill xmlns:a14="http://schemas.microsoft.com/office/drawing/2010/main">
+              <a14:hiddenFill xmlns:a14="http://schemas.microsoft.com/office/drawing/2010/main" xmlns="">
                 <a:solidFill>
                   <a:schemeClr val="accent1"/>
                 </a:solidFill>
               </a14:hiddenFill>
             </a:ext>
             <a:ext uri="{91240B29-F687-4f45-9708-019B960494DF}">
-              <a14:hiddenLine xmlns:a14="http://schemas.microsoft.com/office/drawing/2010/main" w="9525">
+              <a14:hiddenLine xmlns:a14="http://schemas.microsoft.com/office/drawing/2010/main" xmlns="" w="9525">
                 <a:solidFill>
                   <a:schemeClr val="tx1"/>
                 </a:solidFill>
@@ -12963,7 +12177,7 @@
           <a:effectLst/>
           <a:extLst>
             <a:ext uri="{AF507438-7753-43e0-B8FC-AC1667EBCBE1}">
-              <a14:hiddenEffects xmlns:a14="http://schemas.microsoft.com/office/drawing/2010/main">
+              <a14:hiddenEffects xmlns:a14="http://schemas.microsoft.com/office/drawing/2010/main" xmlns="">
                 <a:effectLst>
                   <a:outerShdw blurRad="63500" dist="38099" dir="2700000" algn="ctr" rotWithShape="0">
                     <a:schemeClr val="bg2">
@@ -13005,7 +12219,7 @@
           <a:effectLst/>
           <a:extLst>
             <a:ext uri="{AF507438-7753-43e0-B8FC-AC1667EBCBE1}">
-              <a14:hiddenEffects xmlns:a14="http://schemas.microsoft.com/office/drawing/2010/main">
+              <a14:hiddenEffects xmlns:a14="http://schemas.microsoft.com/office/drawing/2010/main" xmlns="">
                 <a:effectLst>
                   <a:outerShdw blurRad="63500" dist="38099" dir="2700000" algn="ctr" rotWithShape="0">
                     <a:schemeClr val="bg2">
@@ -13047,7 +12261,7 @@
           <a:effectLst/>
           <a:extLst>
             <a:ext uri="{AF507438-7753-43e0-B8FC-AC1667EBCBE1}">
-              <a14:hiddenEffects xmlns:a14="http://schemas.microsoft.com/office/drawing/2010/main">
+              <a14:hiddenEffects xmlns:a14="http://schemas.microsoft.com/office/drawing/2010/main" xmlns="">
                 <a:effectLst>
                   <a:outerShdw blurRad="63500" dist="38099" dir="2700000" algn="ctr" rotWithShape="0">
                     <a:schemeClr val="bg2">
@@ -13095,14 +12309,14 @@
           </a:ln>
           <a:extLst>
             <a:ext uri="{909E8E84-426E-40dd-AFC4-6F175D3DCCD1}">
-              <a14:hiddenFill xmlns:a14="http://schemas.microsoft.com/office/drawing/2010/main">
+              <a14:hiddenFill xmlns:a14="http://schemas.microsoft.com/office/drawing/2010/main" xmlns="">
                 <a:solidFill>
                   <a:schemeClr val="accent1"/>
                 </a:solidFill>
               </a14:hiddenFill>
             </a:ext>
             <a:ext uri="{91240B29-F687-4f45-9708-019B960494DF}">
-              <a14:hiddenLine xmlns:a14="http://schemas.microsoft.com/office/drawing/2010/main" w="9525">
+              <a14:hiddenLine xmlns:a14="http://schemas.microsoft.com/office/drawing/2010/main" xmlns="" w="9525">
                 <a:solidFill>
                   <a:schemeClr val="tx1"/>
                 </a:solidFill>
@@ -13124,11 +12338,11 @@
   <p:clrMapOvr>
     <a:masterClrMapping/>
   </p:clrMapOvr>
-  <p:transition xmlns:p14="http://schemas.microsoft.com/office/powerpoint/2010/main"/>
+  <p:transition/>
   <p:timing>
     <p:tnLst>
       <p:par>
-        <p:cTn xmlns:p14="http://schemas.microsoft.com/office/powerpoint/2010/main" id="1" dur="indefinite" restart="never" nodeType="tmRoot">
+        <p:cTn id="1" dur="indefinite" restart="never" nodeType="tmRoot">
           <p:childTnLst>
             <p:seq concurrent="1" nextAc="seek">
               <p:cTn id="2" dur="indefinite" nodeType="mainSeq">
@@ -13318,14 +12532,14 @@
           </a:ln>
           <a:extLst>
             <a:ext uri="{909E8E84-426E-40dd-AFC4-6F175D3DCCD1}">
-              <a14:hiddenFill xmlns:a14="http://schemas.microsoft.com/office/drawing/2010/main">
+              <a14:hiddenFill xmlns:a14="http://schemas.microsoft.com/office/drawing/2010/main" xmlns="">
                 <a:solidFill>
                   <a:schemeClr val="accent1"/>
                 </a:solidFill>
               </a14:hiddenFill>
             </a:ext>
             <a:ext uri="{91240B29-F687-4f45-9708-019B960494DF}">
-              <a14:hiddenLine xmlns:a14="http://schemas.microsoft.com/office/drawing/2010/main" w="9525">
+              <a14:hiddenLine xmlns:a14="http://schemas.microsoft.com/office/drawing/2010/main" xmlns="" w="9525">
                 <a:solidFill>
                   <a:schemeClr val="tx1"/>
                 </a:solidFill>
@@ -13551,7 +12765,7 @@
           <a:effectLst/>
           <a:extLst>
             <a:ext uri="{AF507438-7753-43e0-B8FC-AC1667EBCBE1}">
-              <a14:hiddenEffects xmlns:a14="http://schemas.microsoft.com/office/drawing/2010/main">
+              <a14:hiddenEffects xmlns:a14="http://schemas.microsoft.com/office/drawing/2010/main" xmlns="">
                 <a:effectLst>
                   <a:outerShdw blurRad="63500" dist="38099" dir="2700000" algn="ctr" rotWithShape="0">
                     <a:schemeClr val="bg2">
@@ -13593,7 +12807,7 @@
           <a:effectLst/>
           <a:extLst>
             <a:ext uri="{AF507438-7753-43e0-B8FC-AC1667EBCBE1}">
-              <a14:hiddenEffects xmlns:a14="http://schemas.microsoft.com/office/drawing/2010/main">
+              <a14:hiddenEffects xmlns:a14="http://schemas.microsoft.com/office/drawing/2010/main" xmlns="">
                 <a:effectLst>
                   <a:outerShdw blurRad="63500" dist="38099" dir="2700000" algn="ctr" rotWithShape="0">
                     <a:schemeClr val="bg2">
@@ -13635,7 +12849,7 @@
           <a:effectLst/>
           <a:extLst>
             <a:ext uri="{AF507438-7753-43e0-B8FC-AC1667EBCBE1}">
-              <a14:hiddenEffects xmlns:a14="http://schemas.microsoft.com/office/drawing/2010/main">
+              <a14:hiddenEffects xmlns:a14="http://schemas.microsoft.com/office/drawing/2010/main" xmlns="">
                 <a:effectLst>
                   <a:outerShdw blurRad="63500" dist="38099" dir="2700000" algn="ctr" rotWithShape="0">
                     <a:schemeClr val="bg2">
@@ -13658,11 +12872,11 @@
   <p:clrMapOvr>
     <a:masterClrMapping/>
   </p:clrMapOvr>
-  <p:transition xmlns:p14="http://schemas.microsoft.com/office/powerpoint/2010/main"/>
+  <p:transition/>
   <p:timing>
     <p:tnLst>
       <p:par>
-        <p:cTn xmlns:p14="http://schemas.microsoft.com/office/powerpoint/2010/main" id="1" dur="indefinite" restart="never" nodeType="tmRoot">
+        <p:cTn id="1" dur="indefinite" restart="never" nodeType="tmRoot">
           <p:childTnLst>
             <p:seq concurrent="1" nextAc="seek">
               <p:cTn id="2" dur="indefinite" nodeType="mainSeq">
@@ -13954,14 +13168,14 @@
           </a:ln>
           <a:extLst>
             <a:ext uri="{909E8E84-426E-40dd-AFC4-6F175D3DCCD1}">
-              <a14:hiddenFill xmlns:a14="http://schemas.microsoft.com/office/drawing/2010/main">
+              <a14:hiddenFill xmlns:a14="http://schemas.microsoft.com/office/drawing/2010/main" xmlns="">
                 <a:solidFill>
                   <a:schemeClr val="accent1"/>
                 </a:solidFill>
               </a14:hiddenFill>
             </a:ext>
             <a:ext uri="{91240B29-F687-4f45-9708-019B960494DF}">
-              <a14:hiddenLine xmlns:a14="http://schemas.microsoft.com/office/drawing/2010/main" w="9525">
+              <a14:hiddenLine xmlns:a14="http://schemas.microsoft.com/office/drawing/2010/main" xmlns="" w="9525">
                 <a:solidFill>
                   <a:schemeClr val="tx1"/>
                 </a:solidFill>
@@ -14051,11 +13265,11 @@
   <p:clrMapOvr>
     <a:masterClrMapping/>
   </p:clrMapOvr>
-  <p:transition xmlns:p14="http://schemas.microsoft.com/office/powerpoint/2010/main"/>
+  <p:transition/>
   <p:timing>
     <p:tnLst>
       <p:par>
-        <p:cTn xmlns:p14="http://schemas.microsoft.com/office/powerpoint/2010/main" id="1" dur="indefinite" restart="never" nodeType="tmRoot">
+        <p:cTn id="1" dur="indefinite" restart="never" nodeType="tmRoot">
           <p:childTnLst>
             <p:seq concurrent="1" nextAc="seek">
               <p:cTn id="2" dur="indefinite" nodeType="mainSeq">
@@ -14298,14 +13512,14 @@
           </a:ln>
           <a:extLst>
             <a:ext uri="{909E8E84-426E-40dd-AFC4-6F175D3DCCD1}">
-              <a14:hiddenFill xmlns:a14="http://schemas.microsoft.com/office/drawing/2010/main">
+              <a14:hiddenFill xmlns:a14="http://schemas.microsoft.com/office/drawing/2010/main" xmlns="">
                 <a:solidFill>
                   <a:schemeClr val="accent1"/>
                 </a:solidFill>
               </a14:hiddenFill>
             </a:ext>
             <a:ext uri="{91240B29-F687-4f45-9708-019B960494DF}">
-              <a14:hiddenLine xmlns:a14="http://schemas.microsoft.com/office/drawing/2010/main" w="9525">
+              <a14:hiddenLine xmlns:a14="http://schemas.microsoft.com/office/drawing/2010/main" xmlns="" w="9525">
                 <a:solidFill>
                   <a:schemeClr val="tx1"/>
                 </a:solidFill>
@@ -14476,7 +13690,7 @@
           <a:effectLst/>
           <a:extLst>
             <a:ext uri="{AF507438-7753-43e0-B8FC-AC1667EBCBE1}">
-              <a14:hiddenEffects xmlns:a14="http://schemas.microsoft.com/office/drawing/2010/main">
+              <a14:hiddenEffects xmlns:a14="http://schemas.microsoft.com/office/drawing/2010/main" xmlns="">
                 <a:effectLst>
                   <a:outerShdw blurRad="63500" dist="38099" dir="2700000" algn="ctr" rotWithShape="0">
                     <a:schemeClr val="bg2">
@@ -14518,7 +13732,7 @@
           <a:effectLst/>
           <a:extLst>
             <a:ext uri="{AF507438-7753-43e0-B8FC-AC1667EBCBE1}">
-              <a14:hiddenEffects xmlns:a14="http://schemas.microsoft.com/office/drawing/2010/main">
+              <a14:hiddenEffects xmlns:a14="http://schemas.microsoft.com/office/drawing/2010/main" xmlns="">
                 <a:effectLst>
                   <a:outerShdw blurRad="63500" dist="38099" dir="2700000" algn="ctr" rotWithShape="0">
                     <a:schemeClr val="bg2">
@@ -14560,7 +13774,7 @@
           <a:effectLst/>
           <a:extLst>
             <a:ext uri="{AF507438-7753-43e0-B8FC-AC1667EBCBE1}">
-              <a14:hiddenEffects xmlns:a14="http://schemas.microsoft.com/office/drawing/2010/main">
+              <a14:hiddenEffects xmlns:a14="http://schemas.microsoft.com/office/drawing/2010/main" xmlns="">
                 <a:effectLst>
                   <a:outerShdw blurRad="63500" dist="38099" dir="2700000" algn="ctr" rotWithShape="0">
                     <a:schemeClr val="bg2">
@@ -14583,11 +13797,11 @@
   <p:clrMapOvr>
     <a:masterClrMapping/>
   </p:clrMapOvr>
-  <p:transition xmlns:p14="http://schemas.microsoft.com/office/powerpoint/2010/main"/>
+  <p:transition/>
   <p:timing>
     <p:tnLst>
       <p:par>
-        <p:cTn xmlns:p14="http://schemas.microsoft.com/office/powerpoint/2010/main" id="1" dur="indefinite" restart="never" nodeType="tmRoot">
+        <p:cTn id="1" dur="indefinite" restart="never" nodeType="tmRoot">
           <p:childTnLst>
             <p:seq concurrent="1" nextAc="seek">
               <p:cTn id="2" dur="indefinite" nodeType="mainSeq">
@@ -14781,14 +13995,14 @@
           </a:ln>
           <a:extLst>
             <a:ext uri="{909E8E84-426E-40dd-AFC4-6F175D3DCCD1}">
-              <a14:hiddenFill xmlns:a14="http://schemas.microsoft.com/office/drawing/2010/main">
+              <a14:hiddenFill xmlns:a14="http://schemas.microsoft.com/office/drawing/2010/main" xmlns="">
                 <a:solidFill>
                   <a:schemeClr val="accent1"/>
                 </a:solidFill>
               </a14:hiddenFill>
             </a:ext>
             <a:ext uri="{91240B29-F687-4f45-9708-019B960494DF}">
-              <a14:hiddenLine xmlns:a14="http://schemas.microsoft.com/office/drawing/2010/main" w="9525">
+              <a14:hiddenLine xmlns:a14="http://schemas.microsoft.com/office/drawing/2010/main" xmlns="" w="9525">
                 <a:solidFill>
                   <a:schemeClr val="tx1"/>
                 </a:solidFill>
@@ -14969,7 +14183,7 @@
           <a:effectLst/>
           <a:extLst>
             <a:ext uri="{AF507438-7753-43e0-B8FC-AC1667EBCBE1}">
-              <a14:hiddenEffects xmlns:a14="http://schemas.microsoft.com/office/drawing/2010/main">
+              <a14:hiddenEffects xmlns:a14="http://schemas.microsoft.com/office/drawing/2010/main" xmlns="">
                 <a:effectLst>
                   <a:outerShdw blurRad="63500" dist="38099" dir="2700000" algn="ctr" rotWithShape="0">
                     <a:schemeClr val="bg2">
@@ -15011,7 +14225,7 @@
           <a:effectLst/>
           <a:extLst>
             <a:ext uri="{AF507438-7753-43e0-B8FC-AC1667EBCBE1}">
-              <a14:hiddenEffects xmlns:a14="http://schemas.microsoft.com/office/drawing/2010/main">
+              <a14:hiddenEffects xmlns:a14="http://schemas.microsoft.com/office/drawing/2010/main" xmlns="">
                 <a:effectLst>
                   <a:outerShdw blurRad="63500" dist="38099" dir="2700000" algn="ctr" rotWithShape="0">
                     <a:schemeClr val="bg2">
@@ -15053,7 +14267,7 @@
           <a:effectLst/>
           <a:extLst>
             <a:ext uri="{AF507438-7753-43e0-B8FC-AC1667EBCBE1}">
-              <a14:hiddenEffects xmlns:a14="http://schemas.microsoft.com/office/drawing/2010/main">
+              <a14:hiddenEffects xmlns:a14="http://schemas.microsoft.com/office/drawing/2010/main" xmlns="">
                 <a:effectLst>
                   <a:outerShdw blurRad="63500" dist="38099" dir="2700000" algn="ctr" rotWithShape="0">
                     <a:schemeClr val="bg2">
@@ -15076,11 +14290,11 @@
   <p:clrMapOvr>
     <a:masterClrMapping/>
   </p:clrMapOvr>
-  <p:transition xmlns:p14="http://schemas.microsoft.com/office/powerpoint/2010/main"/>
+  <p:transition/>
   <p:timing>
     <p:tnLst>
       <p:par>
-        <p:cTn xmlns:p14="http://schemas.microsoft.com/office/powerpoint/2010/main" id="1" dur="indefinite" restart="never" nodeType="tmRoot">
+        <p:cTn id="1" dur="indefinite" restart="never" nodeType="tmRoot">
           <p:childTnLst>
             <p:seq concurrent="1" nextAc="seek">
               <p:cTn id="2" dur="indefinite" nodeType="mainSeq">
@@ -15485,11 +14699,11 @@
   <p:clrMapOvr>
     <a:masterClrMapping/>
   </p:clrMapOvr>
-  <p:transition xmlns:p14="http://schemas.microsoft.com/office/powerpoint/2010/main"/>
+  <p:transition/>
   <p:timing>
     <p:tnLst>
       <p:par>
-        <p:cTn xmlns:p14="http://schemas.microsoft.com/office/powerpoint/2010/main" id="1" dur="indefinite" restart="never" nodeType="tmRoot">
+        <p:cTn id="1" dur="indefinite" restart="never" nodeType="tmRoot">
           <p:childTnLst>
             <p:seq concurrent="1" nextAc="seek">
               <p:cTn id="2" dur="indefinite" nodeType="mainSeq">
@@ -15970,7 +15184,7 @@
   <p:clrMapOvr>
     <a:masterClrMapping/>
   </p:clrMapOvr>
-  <p:transition xmlns:p14="http://schemas.microsoft.com/office/powerpoint/2010/main"/>
+  <p:transition/>
 </p:sld>
 </file>
 
@@ -16151,7 +15365,7 @@
   <p:clrMapOvr>
     <a:masterClrMapping/>
   </p:clrMapOvr>
-  <p:transition xmlns:p14="http://schemas.microsoft.com/office/powerpoint/2010/main"/>
+  <p:transition/>
 </p:sld>
 </file>
 
@@ -16188,15 +15402,18 @@
             <a:ext cx="8429625" cy="3695700"/>
           </a:xfrm>
           <a:extLst>
+            <a:ext uri="{FAA26D3D-D897-4be2-8F04-BA451C77F1D7}">
+              <ma14:placeholderFlag xmlns:ma14="http://schemas.microsoft.com/office/mac/drawingml/2011/main" val="1"/>
+            </a:ext>
             <a:ext uri="{909E8E84-426E-40dd-AFC4-6F175D3DCCD1}">
-              <a14:hiddenFill xmlns:a14="http://schemas.microsoft.com/office/drawing/2010/main">
+              <a14:hiddenFill xmlns:a14="http://schemas.microsoft.com/office/drawing/2010/main" xmlns="">
                 <a:solidFill>
                   <a:srgbClr val="FFFFFF"/>
                 </a:solidFill>
               </a14:hiddenFill>
             </a:ext>
             <a:ext uri="{91240B29-F687-4f45-9708-019B960494DF}">
-              <a14:hiddenLine xmlns:a14="http://schemas.microsoft.com/office/drawing/2010/main" w="9525">
+              <a14:hiddenLine xmlns:a14="http://schemas.microsoft.com/office/drawing/2010/main" xmlns="" w="9525">
                 <a:solidFill>
                   <a:srgbClr val="000000"/>
                 </a:solidFill>
@@ -16205,9 +15422,6 @@
                 <a:tailEnd/>
               </a14:hiddenLine>
             </a:ext>
-            <a:ext uri="{FAA26D3D-D897-4be2-8F04-BA451C77F1D7}">
-              <ma14:placeholderFlag xmlns:ma14="http://schemas.microsoft.com/office/mac/drawingml/2011/main" val="1"/>
-            </a:ext>
           </a:extLst>
         </p:spPr>
         <p:txBody>
@@ -16298,7 +15512,15 @@
                 <a:ea typeface="ヒラギノ角ゴ ProN W6" charset="0"/>
                 <a:cs typeface="ヒラギノ角ゴ ProN W6" charset="0"/>
               </a:rPr>
-              <a:t>. Naïve Bayes classification</a:t>
+              <a:t>. Naïve Bayes </a:t>
+            </a:r>
+            <a:r>
+              <a:rPr lang="en-US" sz="3000" dirty="0" smtClean="0">
+                <a:latin typeface="PFDinTextCompPro-Bold" charset="0"/>
+                <a:ea typeface="ヒラギノ角ゴ ProN W6" charset="0"/>
+                <a:cs typeface="ヒラギノ角ゴ ProN W6" charset="0"/>
+              </a:rPr>
+              <a:t>classification</a:t>
             </a:r>
             <a:br>
               <a:rPr lang="en-US" sz="3000" dirty="0" smtClean="0">
@@ -16409,11 +15631,11 @@
   <p:clrMapOvr>
     <a:masterClrMapping/>
   </p:clrMapOvr>
-  <p:transition xmlns:p14="http://schemas.microsoft.com/office/powerpoint/2010/main"/>
+  <p:transition/>
   <p:timing>
     <p:tnLst>
       <p:par>
-        <p:cTn xmlns:p14="http://schemas.microsoft.com/office/powerpoint/2010/main" id="1" dur="indefinite" restart="never" nodeType="tmRoot"/>
+        <p:cTn id="1" dur="indefinite" restart="never" nodeType="tmRoot"/>
       </p:par>
     </p:tnLst>
   </p:timing>
@@ -16697,7 +15919,7 @@
   <p:clrMapOvr>
     <a:masterClrMapping/>
   </p:clrMapOvr>
-  <p:transition xmlns:p14="http://schemas.microsoft.com/office/powerpoint/2010/main"/>
+  <p:transition/>
 </p:sld>
 </file>
 
@@ -17197,7 +16419,7 @@
   <p:clrMapOvr>
     <a:masterClrMapping/>
   </p:clrMapOvr>
-  <p:transition xmlns:p14="http://schemas.microsoft.com/office/powerpoint/2010/main"/>
+  <p:transition/>
 </p:sld>
 </file>
 
@@ -17323,11 +16545,11 @@
   <p:clrMapOvr>
     <a:masterClrMapping/>
   </p:clrMapOvr>
-  <p:transition xmlns:p14="http://schemas.microsoft.com/office/powerpoint/2010/main"/>
+  <p:transition/>
   <p:timing>
     <p:tnLst>
       <p:par>
-        <p:cTn xmlns:p14="http://schemas.microsoft.com/office/powerpoint/2010/main" id="1" dur="indefinite" restart="never" nodeType="tmRoot"/>
+        <p:cTn id="1" dur="indefinite" restart="never" nodeType="tmRoot"/>
       </p:par>
     </p:tnLst>
   </p:timing>
@@ -17688,11 +16910,11 @@
   <p:clrMapOvr>
     <a:masterClrMapping/>
   </p:clrMapOvr>
-  <p:transition xmlns:p14="http://schemas.microsoft.com/office/powerpoint/2010/main"/>
+  <p:transition/>
   <p:timing>
     <p:tnLst>
       <p:par>
-        <p:cTn xmlns:p14="http://schemas.microsoft.com/office/powerpoint/2010/main" id="1" dur="indefinite" restart="never" nodeType="tmRoot">
+        <p:cTn id="1" dur="indefinite" restart="never" nodeType="tmRoot">
           <p:childTnLst>
             <p:seq concurrent="1" nextAc="seek">
               <p:cTn id="2" dur="indefinite" nodeType="mainSeq">
@@ -17916,7 +17138,7 @@
         </p:blipFill>
         <p:spPr>
           <a:xfrm>
-            <a:off x="1100137" y="2176518"/>
+            <a:off x="1100137" y="2019300"/>
             <a:ext cx="6723063" cy="1747782"/>
           </a:xfrm>
           <a:prstGeom prst="rect">
@@ -17933,7 +17155,7 @@
         <p:spPr>
           <a:xfrm>
             <a:off x="566737" y="1104900"/>
-            <a:ext cx="8382000" cy="1477328"/>
+            <a:ext cx="8382000" cy="1046440"/>
           </a:xfrm>
           <a:prstGeom prst="rect">
             <a:avLst/>
@@ -17955,25 +17177,18 @@
               <a:t>This term is the </a:t>
             </a:r>
             <a:r>
-              <a:rPr lang="en-US" sz="2800" b="1" dirty="0" smtClean="0">
+              <a:rPr lang="en-US" sz="2800" dirty="0" smtClean="0">
                 <a:latin typeface="PFDinTextCompPro-Medium"/>
                 <a:cs typeface="PFDinTextCompPro-Medium"/>
               </a:rPr>
               <a:t>prior probability</a:t>
             </a:r>
             <a:r>
-              <a:rPr lang="en-US" sz="3000" b="1" dirty="0" smtClean="0">
-                <a:latin typeface="PFDinTextCompPro-Italic"/>
-                <a:cs typeface="PFDinTextCompPro-Italic"/>
-              </a:rPr>
-              <a:t> </a:t>
-            </a:r>
-            <a:r>
               <a:rPr lang="en-US" sz="3000" dirty="0" smtClean="0">
                 <a:latin typeface="PFDinTextCompPro-Italic"/>
                 <a:cs typeface="PFDinTextCompPro-Italic"/>
               </a:rPr>
-              <a:t>of </a:t>
+              <a:t> of </a:t>
             </a:r>
             <a:r>
               <a:rPr lang="en-US" sz="2000" i="1" dirty="0" smtClean="0">
@@ -18055,7 +17270,7 @@
           <a:effectLst/>
           <a:extLst>
             <a:ext uri="{AF507438-7753-43e0-B8FC-AC1667EBCBE1}">
-              <a14:hiddenEffects xmlns:a14="http://schemas.microsoft.com/office/drawing/2010/main">
+              <a14:hiddenEffects xmlns:a14="http://schemas.microsoft.com/office/drawing/2010/main" xmlns="">
                 <a:effectLst>
                   <a:outerShdw blurRad="63500" dist="38099" dir="2700000" algn="ctr" rotWithShape="0">
                     <a:schemeClr val="bg2">
@@ -18078,11 +17293,11 @@
   <p:clrMapOvr>
     <a:masterClrMapping/>
   </p:clrMapOvr>
-  <p:transition xmlns:p14="http://schemas.microsoft.com/office/powerpoint/2010/main"/>
+  <p:transition/>
   <p:timing>
     <p:tnLst>
       <p:par>
-        <p:cTn xmlns:p14="http://schemas.microsoft.com/office/powerpoint/2010/main" id="1" dur="indefinite" restart="never" nodeType="tmRoot"/>
+        <p:cTn id="1" dur="indefinite" restart="never" nodeType="tmRoot"/>
       </p:par>
     </p:tnLst>
   </p:timing>
@@ -18168,301 +17383,6 @@
                 <a:defRPr/>
               </a:pPr>
               <a:t>25</a:t>
-            </a:fld>
-            <a:endParaRPr lang="en-US"/>
-          </a:p>
-        </p:txBody>
-      </p:sp>
-      <p:pic>
-        <p:nvPicPr>
-          <p:cNvPr id="6" name="Picture 5"/>
-          <p:cNvPicPr>
-            <a:picLocks noChangeAspect="1"/>
-          </p:cNvPicPr>
-          <p:nvPr/>
-        </p:nvPicPr>
-        <p:blipFill>
-          <a:blip r:embed="rId3"/>
-          <a:stretch>
-            <a:fillRect/>
-          </a:stretch>
-        </p:blipFill>
-        <p:spPr>
-          <a:xfrm>
-            <a:off x="1100137" y="2328918"/>
-            <a:ext cx="6723063" cy="1747782"/>
-          </a:xfrm>
-          <a:prstGeom prst="rect">
-            <a:avLst/>
-          </a:prstGeom>
-        </p:spPr>
-      </p:pic>
-      <p:sp>
-        <p:nvSpPr>
-          <p:cNvPr id="9" name="TextBox 8"/>
-          <p:cNvSpPr txBox="1"/>
-          <p:nvPr/>
-        </p:nvSpPr>
-        <p:spPr>
-          <a:xfrm>
-            <a:off x="566737" y="1156037"/>
-            <a:ext cx="8382000" cy="1446550"/>
-          </a:xfrm>
-          <a:prstGeom prst="rect">
-            <a:avLst/>
-          </a:prstGeom>
-          <a:noFill/>
-        </p:spPr>
-        <p:txBody>
-          <a:bodyPr wrap="square" rtlCol="0">
-            <a:spAutoFit/>
-          </a:bodyPr>
-          <a:lstStyle/>
-          <a:p>
-            <a:pPr algn="l"/>
-            <a:r>
-              <a:rPr lang="en-US" sz="2800" dirty="0" smtClean="0">
-                <a:latin typeface="PFDinTextCompPro-Italic"/>
-                <a:cs typeface="PFDinTextCompPro-Italic"/>
-              </a:rPr>
-              <a:t>This term is the </a:t>
-            </a:r>
-            <a:r>
-              <a:rPr lang="en-US" sz="2800" b="1" dirty="0" smtClean="0">
-                <a:latin typeface="PFDinTextCompPro-Medium"/>
-                <a:cs typeface="PFDinTextCompPro-Medium"/>
-              </a:rPr>
-              <a:t>likelihood functio</a:t>
-            </a:r>
-            <a:r>
-              <a:rPr lang="en-US" sz="2800" dirty="0" smtClean="0">
-                <a:latin typeface="PFDinTextCompPro-Medium"/>
-                <a:cs typeface="PFDinTextCompPro-Medium"/>
-              </a:rPr>
-              <a:t>n</a:t>
-            </a:r>
-            <a:r>
-              <a:rPr lang="en-US" sz="2800" dirty="0" smtClean="0">
-                <a:latin typeface="PFDinTextCompPro-Italic"/>
-                <a:cs typeface="PFDinTextCompPro-Italic"/>
-              </a:rPr>
-              <a:t>. It represents the joint probability of observing features</a:t>
-            </a:r>
-            <a:r>
-              <a:rPr lang="en-US" sz="3000" dirty="0" smtClean="0">
-                <a:latin typeface="PFDinTextCompPro-Italic"/>
-                <a:cs typeface="PFDinTextCompPro-Italic"/>
-              </a:rPr>
-              <a:t> </a:t>
-            </a:r>
-            <a:r>
-              <a:rPr lang="en-US" sz="2000" dirty="0" smtClean="0">
-                <a:latin typeface="+mn-lt"/>
-                <a:cs typeface="PFDinTextCompPro-Italic"/>
-              </a:rPr>
-              <a:t>{</a:t>
-            </a:r>
-            <a:r>
-              <a:rPr lang="en-US" sz="2000" i="1" dirty="0" smtClean="0">
-                <a:latin typeface="+mn-lt"/>
-                <a:cs typeface="PFDinTextCompPro-Italic"/>
-              </a:rPr>
-              <a:t>x</a:t>
-            </a:r>
-            <a:r>
-              <a:rPr lang="en-US" sz="2000" i="1" baseline="-25000" dirty="0" smtClean="0">
-                <a:latin typeface="+mn-lt"/>
-                <a:cs typeface="PFDinTextCompPro-Italic"/>
-              </a:rPr>
-              <a:t>i</a:t>
-            </a:r>
-            <a:r>
-              <a:rPr lang="en-US" sz="2000" dirty="0" smtClean="0">
-                <a:latin typeface="PFDinTextCompPro-Italic"/>
-                <a:cs typeface="PFDinTextCompPro-Italic"/>
-              </a:rPr>
-              <a:t>}</a:t>
-            </a:r>
-            <a:r>
-              <a:rPr lang="en-US" sz="3000" dirty="0" smtClean="0">
-                <a:latin typeface="PFDinTextCompPro-Italic"/>
-                <a:cs typeface="PFDinTextCompPro-Italic"/>
-              </a:rPr>
-              <a:t> </a:t>
-            </a:r>
-            <a:r>
-              <a:rPr lang="en-US" sz="2800" dirty="0" smtClean="0">
-                <a:latin typeface="PFDinTextCompPro-Italic"/>
-                <a:cs typeface="PFDinTextCompPro-Italic"/>
-              </a:rPr>
-              <a:t>given that that record belongs to class</a:t>
-            </a:r>
-            <a:r>
-              <a:rPr lang="en-US" sz="3000" dirty="0" smtClean="0">
-                <a:latin typeface="PFDinTextCompPro-Italic"/>
-                <a:cs typeface="PFDinTextCompPro-Italic"/>
-              </a:rPr>
-              <a:t> </a:t>
-            </a:r>
-            <a:r>
-              <a:rPr lang="en-US" sz="2000" i="1" dirty="0" smtClean="0">
-                <a:latin typeface="+mn-lt"/>
-                <a:cs typeface="PFDinTextCompPro-Italic"/>
-              </a:rPr>
-              <a:t>C</a:t>
-            </a:r>
-            <a:r>
-              <a:rPr lang="en-US" sz="3000" dirty="0" smtClean="0">
-                <a:latin typeface="PFDinTextCompPro-Italic"/>
-                <a:cs typeface="PFDinTextCompPro-Italic"/>
-              </a:rPr>
-              <a:t>.</a:t>
-            </a:r>
-          </a:p>
-        </p:txBody>
-      </p:sp>
-      <p:cxnSp>
-        <p:nvCxnSpPr>
-          <p:cNvPr id="3" name="Straight Arrow Connector 2"/>
-          <p:cNvCxnSpPr/>
-          <p:nvPr/>
-        </p:nvCxnSpPr>
-        <p:spPr bwMode="auto">
-          <a:xfrm flipV="1">
-            <a:off x="4300537" y="3232282"/>
-            <a:ext cx="457200" cy="844418"/>
-          </a:xfrm>
-          <a:prstGeom prst="straightConnector1">
-            <a:avLst/>
-          </a:prstGeom>
-          <a:solidFill>
-            <a:schemeClr val="accent1"/>
-          </a:solidFill>
-          <a:ln w="25400" cap="flat" cmpd="sng" algn="ctr">
-            <a:solidFill>
-              <a:srgbClr val="FF0000"/>
-            </a:solidFill>
-            <a:prstDash val="solid"/>
-            <a:round/>
-            <a:headEnd type="none" w="med" len="med"/>
-            <a:tailEnd type="arrow"/>
-          </a:ln>
-          <a:effectLst/>
-          <a:extLst>
-            <a:ext uri="{AF507438-7753-43e0-B8FC-AC1667EBCBE1}">
-              <a14:hiddenEffects xmlns:a14="http://schemas.microsoft.com/office/drawing/2010/main">
-                <a:effectLst>
-                  <a:outerShdw blurRad="63500" dist="38099" dir="2700000" algn="ctr" rotWithShape="0">
-                    <a:schemeClr val="bg2">
-                      <a:alpha val="74998"/>
-                    </a:schemeClr>
-                  </a:outerShdw>
-                </a:effectLst>
-              </a14:hiddenEffects>
-            </a:ext>
-          </a:extLst>
-        </p:spPr>
-      </p:cxnSp>
-    </p:spTree>
-    <p:extLst>
-      <p:ext uri="{BB962C8B-B14F-4D97-AF65-F5344CB8AC3E}">
-        <p14:creationId xmlns:p14="http://schemas.microsoft.com/office/powerpoint/2010/main" val="277305636"/>
-      </p:ext>
-    </p:extLst>
-  </p:cSld>
-  <p:clrMapOvr>
-    <a:masterClrMapping/>
-  </p:clrMapOvr>
-  <p:transition xmlns:p14="http://schemas.microsoft.com/office/powerpoint/2010/main"/>
-  <p:timing>
-    <p:tnLst>
-      <p:par>
-        <p:cTn xmlns:p14="http://schemas.microsoft.com/office/powerpoint/2010/main" id="1" dur="indefinite" restart="never" nodeType="tmRoot"/>
-      </p:par>
-    </p:tnLst>
-  </p:timing>
-</p:sld>
-</file>
-
-<file path=ppt/slides/slide26.xml><?xml version="1.0" encoding="utf-8"?>
-<p:sld xmlns:a="http://schemas.openxmlformats.org/drawingml/2006/main" xmlns:r="http://schemas.openxmlformats.org/officeDocument/2006/relationships" xmlns:p="http://schemas.openxmlformats.org/presentationml/2006/main">
-  <p:cSld>
-    <p:spTree>
-      <p:nvGrpSpPr>
-        <p:cNvPr id="1" name=""/>
-        <p:cNvGrpSpPr/>
-        <p:nvPr/>
-      </p:nvGrpSpPr>
-      <p:grpSpPr>
-        <a:xfrm>
-          <a:off x="0" y="0"/>
-          <a:ext cx="0" cy="0"/>
-          <a:chOff x="0" y="0"/>
-          <a:chExt cx="0" cy="0"/>
-        </a:xfrm>
-      </p:grpSpPr>
-      <p:sp>
-        <p:nvSpPr>
-          <p:cNvPr id="4" name="Content Placeholder 3"/>
-          <p:cNvSpPr>
-            <a:spLocks noGrp="1"/>
-          </p:cNvSpPr>
-          <p:nvPr>
-            <p:ph sz="quarter" idx="11"/>
-          </p:nvPr>
-        </p:nvSpPr>
-        <p:spPr>
-          <a:xfrm>
-            <a:off x="414337" y="495300"/>
-            <a:ext cx="6400800" cy="304800"/>
-          </a:xfrm>
-        </p:spPr>
-        <p:txBody>
-          <a:bodyPr/>
-          <a:lstStyle/>
-          <a:p>
-            <a:pPr eaLnBrk="1" hangingPunct="1">
-              <a:lnSpc>
-                <a:spcPts val="2448"/>
-              </a:lnSpc>
-              <a:defRPr/>
-            </a:pPr>
-            <a:r>
-              <a:rPr lang="en-US"/>
-              <a:t>Bayesian </a:t>
-            </a:r>
-            <a:r>
-              <a:rPr lang="en-US" smtClean="0"/>
-              <a:t>inference</a:t>
-            </a:r>
-            <a:endParaRPr lang="en-US"/>
-          </a:p>
-        </p:txBody>
-      </p:sp>
-      <p:sp>
-        <p:nvSpPr>
-          <p:cNvPr id="8" name="Slide Number Placeholder 3"/>
-          <p:cNvSpPr>
-            <a:spLocks noGrp="1"/>
-          </p:cNvSpPr>
-          <p:nvPr>
-            <p:ph type="sldNum" sz="quarter" idx="13"/>
-          </p:nvPr>
-        </p:nvSpPr>
-        <p:spPr/>
-        <p:txBody>
-          <a:bodyPr/>
-          <a:lstStyle/>
-          <a:p>
-            <a:pPr>
-              <a:defRPr/>
-            </a:pPr>
-            <a:fld id="{BD5AD749-DAD1-6A4A-A2AA-CB20EAD0AEB7}" type="slidenum">
-              <a:rPr lang="en-US"/>
-              <a:pPr>
-                <a:defRPr/>
-              </a:pPr>
-              <a:t>26</a:t>
             </a:fld>
             <a:endParaRPr lang="en-US"/>
           </a:p>
@@ -18500,6 +17420,294 @@
         </p:nvSpPr>
         <p:spPr>
           <a:xfrm>
+            <a:off x="566737" y="1156037"/>
+            <a:ext cx="8382000" cy="1015663"/>
+          </a:xfrm>
+          <a:prstGeom prst="rect">
+            <a:avLst/>
+          </a:prstGeom>
+          <a:noFill/>
+        </p:spPr>
+        <p:txBody>
+          <a:bodyPr wrap="square" rtlCol="0">
+            <a:spAutoFit/>
+          </a:bodyPr>
+          <a:lstStyle/>
+          <a:p>
+            <a:pPr algn="l"/>
+            <a:r>
+              <a:rPr lang="en-US" sz="2800" dirty="0" smtClean="0">
+                <a:latin typeface="PFDinTextCompPro-Italic"/>
+                <a:cs typeface="PFDinTextCompPro-Italic"/>
+              </a:rPr>
+              <a:t>This term is the </a:t>
+            </a:r>
+            <a:r>
+              <a:rPr lang="en-US" sz="2800" dirty="0" smtClean="0">
+                <a:latin typeface="PFDinTextCompPro-Medium"/>
+                <a:cs typeface="PFDinTextCompPro-Medium"/>
+              </a:rPr>
+              <a:t>likelihood function</a:t>
+            </a:r>
+            <a:r>
+              <a:rPr lang="en-US" sz="2800" dirty="0" smtClean="0">
+                <a:latin typeface="PFDinTextCompPro-Italic"/>
+                <a:cs typeface="PFDinTextCompPro-Italic"/>
+              </a:rPr>
+              <a:t>. It represents the joint probability of observing features</a:t>
+            </a:r>
+            <a:r>
+              <a:rPr lang="en-US" sz="3000" dirty="0" smtClean="0">
+                <a:latin typeface="PFDinTextCompPro-Italic"/>
+                <a:cs typeface="PFDinTextCompPro-Italic"/>
+              </a:rPr>
+              <a:t> </a:t>
+            </a:r>
+            <a:r>
+              <a:rPr lang="en-US" sz="2000" dirty="0" smtClean="0">
+                <a:latin typeface="+mn-lt"/>
+                <a:cs typeface="PFDinTextCompPro-Italic"/>
+              </a:rPr>
+              <a:t>{</a:t>
+            </a:r>
+            <a:r>
+              <a:rPr lang="en-US" sz="2000" i="1" dirty="0" smtClean="0">
+                <a:latin typeface="+mn-lt"/>
+                <a:cs typeface="PFDinTextCompPro-Italic"/>
+              </a:rPr>
+              <a:t>x</a:t>
+            </a:r>
+            <a:r>
+              <a:rPr lang="en-US" sz="2000" i="1" baseline="-25000" dirty="0" smtClean="0">
+                <a:latin typeface="+mn-lt"/>
+                <a:cs typeface="PFDinTextCompPro-Italic"/>
+              </a:rPr>
+              <a:t>i</a:t>
+            </a:r>
+            <a:r>
+              <a:rPr lang="en-US" sz="2000" dirty="0" smtClean="0">
+                <a:latin typeface="PFDinTextCompPro-Italic"/>
+                <a:cs typeface="PFDinTextCompPro-Italic"/>
+              </a:rPr>
+              <a:t>}</a:t>
+            </a:r>
+            <a:r>
+              <a:rPr lang="en-US" sz="3000" dirty="0" smtClean="0">
+                <a:latin typeface="PFDinTextCompPro-Italic"/>
+                <a:cs typeface="PFDinTextCompPro-Italic"/>
+              </a:rPr>
+              <a:t> </a:t>
+            </a:r>
+            <a:r>
+              <a:rPr lang="en-US" sz="2800" dirty="0" smtClean="0">
+                <a:latin typeface="PFDinTextCompPro-Italic"/>
+                <a:cs typeface="PFDinTextCompPro-Italic"/>
+              </a:rPr>
+              <a:t>given that that record belongs to class</a:t>
+            </a:r>
+            <a:r>
+              <a:rPr lang="en-US" sz="3000" dirty="0" smtClean="0">
+                <a:latin typeface="PFDinTextCompPro-Italic"/>
+                <a:cs typeface="PFDinTextCompPro-Italic"/>
+              </a:rPr>
+              <a:t> </a:t>
+            </a:r>
+            <a:r>
+              <a:rPr lang="en-US" sz="2000" i="1" dirty="0" smtClean="0">
+                <a:latin typeface="+mn-lt"/>
+                <a:cs typeface="PFDinTextCompPro-Italic"/>
+              </a:rPr>
+              <a:t>C</a:t>
+            </a:r>
+            <a:r>
+              <a:rPr lang="en-US" sz="3000" dirty="0" smtClean="0">
+                <a:latin typeface="PFDinTextCompPro-Italic"/>
+                <a:cs typeface="PFDinTextCompPro-Italic"/>
+              </a:rPr>
+              <a:t>.</a:t>
+            </a:r>
+          </a:p>
+        </p:txBody>
+      </p:sp>
+      <p:cxnSp>
+        <p:nvCxnSpPr>
+          <p:cNvPr id="3" name="Straight Arrow Connector 2"/>
+          <p:cNvCxnSpPr/>
+          <p:nvPr/>
+        </p:nvCxnSpPr>
+        <p:spPr bwMode="auto">
+          <a:xfrm flipV="1">
+            <a:off x="4300537" y="2851282"/>
+            <a:ext cx="457200" cy="844418"/>
+          </a:xfrm>
+          <a:prstGeom prst="straightConnector1">
+            <a:avLst/>
+          </a:prstGeom>
+          <a:solidFill>
+            <a:schemeClr val="accent1"/>
+          </a:solidFill>
+          <a:ln w="25400" cap="flat" cmpd="sng" algn="ctr">
+            <a:solidFill>
+              <a:srgbClr val="FF0000"/>
+            </a:solidFill>
+            <a:prstDash val="solid"/>
+            <a:round/>
+            <a:headEnd type="none" w="med" len="med"/>
+            <a:tailEnd type="arrow"/>
+          </a:ln>
+          <a:effectLst/>
+          <a:extLst>
+            <a:ext uri="{AF507438-7753-43e0-B8FC-AC1667EBCBE1}">
+              <a14:hiddenEffects xmlns:a14="http://schemas.microsoft.com/office/drawing/2010/main" xmlns="">
+                <a:effectLst>
+                  <a:outerShdw blurRad="63500" dist="38099" dir="2700000" algn="ctr" rotWithShape="0">
+                    <a:schemeClr val="bg2">
+                      <a:alpha val="74998"/>
+                    </a:schemeClr>
+                  </a:outerShdw>
+                </a:effectLst>
+              </a14:hiddenEffects>
+            </a:ext>
+          </a:extLst>
+        </p:spPr>
+      </p:cxnSp>
+    </p:spTree>
+    <p:extLst>
+      <p:ext uri="{BB962C8B-B14F-4D97-AF65-F5344CB8AC3E}">
+        <p14:creationId xmlns:p14="http://schemas.microsoft.com/office/powerpoint/2010/main" val="277305636"/>
+      </p:ext>
+    </p:extLst>
+  </p:cSld>
+  <p:clrMapOvr>
+    <a:masterClrMapping/>
+  </p:clrMapOvr>
+  <p:transition/>
+  <p:timing>
+    <p:tnLst>
+      <p:par>
+        <p:cTn id="1" dur="indefinite" restart="never" nodeType="tmRoot"/>
+      </p:par>
+    </p:tnLst>
+  </p:timing>
+</p:sld>
+</file>
+
+<file path=ppt/slides/slide26.xml><?xml version="1.0" encoding="utf-8"?>
+<p:sld xmlns:a="http://schemas.openxmlformats.org/drawingml/2006/main" xmlns:r="http://schemas.openxmlformats.org/officeDocument/2006/relationships" xmlns:p="http://schemas.openxmlformats.org/presentationml/2006/main">
+  <p:cSld>
+    <p:spTree>
+      <p:nvGrpSpPr>
+        <p:cNvPr id="1" name=""/>
+        <p:cNvGrpSpPr/>
+        <p:nvPr/>
+      </p:nvGrpSpPr>
+      <p:grpSpPr>
+        <a:xfrm>
+          <a:off x="0" y="0"/>
+          <a:ext cx="0" cy="0"/>
+          <a:chOff x="0" y="0"/>
+          <a:chExt cx="0" cy="0"/>
+        </a:xfrm>
+      </p:grpSpPr>
+      <p:sp>
+        <p:nvSpPr>
+          <p:cNvPr id="4" name="Content Placeholder 3"/>
+          <p:cNvSpPr>
+            <a:spLocks noGrp="1"/>
+          </p:cNvSpPr>
+          <p:nvPr>
+            <p:ph sz="quarter" idx="11"/>
+          </p:nvPr>
+        </p:nvSpPr>
+        <p:spPr>
+          <a:xfrm>
+            <a:off x="414337" y="495300"/>
+            <a:ext cx="6400800" cy="304800"/>
+          </a:xfrm>
+        </p:spPr>
+        <p:txBody>
+          <a:bodyPr/>
+          <a:lstStyle/>
+          <a:p>
+            <a:pPr eaLnBrk="1" hangingPunct="1">
+              <a:lnSpc>
+                <a:spcPts val="2448"/>
+              </a:lnSpc>
+              <a:defRPr/>
+            </a:pPr>
+            <a:r>
+              <a:rPr lang="en-US"/>
+              <a:t>Bayesian </a:t>
+            </a:r>
+            <a:r>
+              <a:rPr lang="en-US" smtClean="0"/>
+              <a:t>inference</a:t>
+            </a:r>
+            <a:endParaRPr lang="en-US"/>
+          </a:p>
+        </p:txBody>
+      </p:sp>
+      <p:sp>
+        <p:nvSpPr>
+          <p:cNvPr id="8" name="Slide Number Placeholder 3"/>
+          <p:cNvSpPr>
+            <a:spLocks noGrp="1"/>
+          </p:cNvSpPr>
+          <p:nvPr>
+            <p:ph type="sldNum" sz="quarter" idx="13"/>
+          </p:nvPr>
+        </p:nvSpPr>
+        <p:spPr/>
+        <p:txBody>
+          <a:bodyPr/>
+          <a:lstStyle/>
+          <a:p>
+            <a:pPr>
+              <a:defRPr/>
+            </a:pPr>
+            <a:fld id="{BD5AD749-DAD1-6A4A-A2AA-CB20EAD0AEB7}" type="slidenum">
+              <a:rPr lang="en-US"/>
+              <a:pPr>
+                <a:defRPr/>
+              </a:pPr>
+              <a:t>26</a:t>
+            </a:fld>
+            <a:endParaRPr lang="en-US"/>
+          </a:p>
+        </p:txBody>
+      </p:sp>
+      <p:pic>
+        <p:nvPicPr>
+          <p:cNvPr id="6" name="Picture 5"/>
+          <p:cNvPicPr>
+            <a:picLocks noChangeAspect="1"/>
+          </p:cNvPicPr>
+          <p:nvPr/>
+        </p:nvPicPr>
+        <p:blipFill>
+          <a:blip r:embed="rId3"/>
+          <a:stretch>
+            <a:fillRect/>
+          </a:stretch>
+        </p:blipFill>
+        <p:spPr>
+          <a:xfrm>
+            <a:off x="1100137" y="2019300"/>
+            <a:ext cx="6723063" cy="1747782"/>
+          </a:xfrm>
+          <a:prstGeom prst="rect">
+            <a:avLst/>
+          </a:prstGeom>
+        </p:spPr>
+      </p:pic>
+      <p:sp>
+        <p:nvSpPr>
+          <p:cNvPr id="9" name="TextBox 8"/>
+          <p:cNvSpPr txBox="1"/>
+          <p:nvPr/>
+        </p:nvSpPr>
+        <p:spPr>
+          <a:xfrm>
             <a:off x="566737" y="1104900"/>
             <a:ext cx="8382000" cy="1015663"/>
           </a:xfrm>
@@ -18523,18 +17731,11 @@
               <a:t>This term is the </a:t>
             </a:r>
             <a:r>
-              <a:rPr lang="en-US" sz="2800" b="1" dirty="0" smtClean="0">
-                <a:latin typeface="PFDinTextCompPro-Medium"/>
-                <a:cs typeface="PFDinTextCompPro-Medium"/>
-              </a:rPr>
-              <a:t>normalization constant</a:t>
-            </a:r>
-            <a:r>
               <a:rPr lang="en-US" sz="2800" dirty="0" smtClean="0">
                 <a:latin typeface="PFDinTextCompPro-Medium"/>
                 <a:cs typeface="PFDinTextCompPro-Medium"/>
               </a:rPr>
-              <a:t>. </a:t>
+              <a:t>normalization constant. </a:t>
             </a:r>
             <a:r>
               <a:rPr lang="en-US" sz="2800" dirty="0" smtClean="0">
@@ -18569,8 +17770,19 @@
                 <a:latin typeface="PFDinTextCompPro-Italic"/>
                 <a:cs typeface="PFDinTextCompPro-Italic"/>
               </a:rPr>
-              <a:t>and is generally ignored.</a:t>
-            </a:r>
+              <a:t>and is </a:t>
+            </a:r>
+            <a:r>
+              <a:rPr lang="en-US" sz="2800" smtClean="0">
+                <a:latin typeface="PFDinTextCompPro-Italic"/>
+                <a:cs typeface="PFDinTextCompPro-Italic"/>
+              </a:rPr>
+              <a:t>generally ignored.</a:t>
+            </a:r>
+            <a:endParaRPr lang="en-US" sz="2800" dirty="0" smtClean="0">
+              <a:latin typeface="PFDinTextCompPro-Italic"/>
+              <a:cs typeface="PFDinTextCompPro-Italic"/>
+            </a:endParaRPr>
           </a:p>
         </p:txBody>
       </p:sp>
@@ -18603,7 +17815,7 @@
           <a:effectLst/>
           <a:extLst>
             <a:ext uri="{AF507438-7753-43e0-B8FC-AC1667EBCBE1}">
-              <a14:hiddenEffects xmlns:a14="http://schemas.microsoft.com/office/drawing/2010/main">
+              <a14:hiddenEffects xmlns:a14="http://schemas.microsoft.com/office/drawing/2010/main" xmlns="">
                 <a:effectLst>
                   <a:outerShdw blurRad="63500" dist="38099" dir="2700000" algn="ctr" rotWithShape="0">
                     <a:schemeClr val="bg2">
@@ -18626,11 +17838,11 @@
   <p:clrMapOvr>
     <a:masterClrMapping/>
   </p:clrMapOvr>
-  <p:transition xmlns:p14="http://schemas.microsoft.com/office/powerpoint/2010/main"/>
+  <p:transition/>
   <p:timing>
     <p:tnLst>
       <p:par>
-        <p:cTn xmlns:p14="http://schemas.microsoft.com/office/powerpoint/2010/main" id="1" dur="indefinite" restart="never" nodeType="tmRoot"/>
+        <p:cTn id="1" dur="indefinite" restart="never" nodeType="tmRoot"/>
       </p:par>
     </p:tnLst>
   </p:timing>
@@ -18870,7 +18082,7 @@
           <a:effectLst/>
           <a:extLst>
             <a:ext uri="{AF507438-7753-43e0-B8FC-AC1667EBCBE1}">
-              <a14:hiddenEffects xmlns:a14="http://schemas.microsoft.com/office/drawing/2010/main">
+              <a14:hiddenEffects xmlns:a14="http://schemas.microsoft.com/office/drawing/2010/main" xmlns="">
                 <a:effectLst>
                   <a:outerShdw blurRad="63500" dist="38099" dir="2700000" algn="ctr" rotWithShape="0">
                     <a:schemeClr val="bg2">
@@ -18957,11 +18169,11 @@
   <p:clrMapOvr>
     <a:masterClrMapping/>
   </p:clrMapOvr>
-  <p:transition xmlns:p14="http://schemas.microsoft.com/office/powerpoint/2010/main"/>
+  <p:transition/>
   <p:timing>
     <p:tnLst>
       <p:par>
-        <p:cTn xmlns:p14="http://schemas.microsoft.com/office/powerpoint/2010/main" id="1" dur="indefinite" restart="never" nodeType="tmRoot">
+        <p:cTn id="1" dur="indefinite" restart="never" nodeType="tmRoot">
           <p:childTnLst>
             <p:seq concurrent="1" nextAc="seek">
               <p:cTn id="2" dur="indefinite" nodeType="mainSeq">
@@ -19182,7 +18394,14 @@
                 <a:latin typeface="PFDinTextCompPro-Italic"/>
                 <a:cs typeface="PFDinTextCompPro-Italic"/>
               </a:rPr>
-              <a:t>Q: What piece of the puzzle we’ve seen so far looks like it could intractably difficult in practice?</a:t>
+              <a:t>Q: What piece of the puzzle we’ve seen so far looks like it could intractably difficult in practice</a:t>
+            </a:r>
+            <a:r>
+              <a:rPr lang="en-US" sz="2800" dirty="0" smtClean="0">
+                <a:latin typeface="PFDinTextCompPro-Italic"/>
+                <a:cs typeface="PFDinTextCompPro-Italic"/>
+              </a:rPr>
+              <a:t>?</a:t>
             </a:r>
             <a:endParaRPr lang="en-US" sz="1400" i="1" dirty="0">
               <a:latin typeface="PFDinTextCompPro-Italic"/>
@@ -19208,11 +18427,11 @@
   <p:clrMapOvr>
     <a:masterClrMapping/>
   </p:clrMapOvr>
-  <p:transition xmlns:p14="http://schemas.microsoft.com/office/powerpoint/2010/main"/>
+  <p:transition/>
   <p:timing>
     <p:tnLst>
       <p:par>
-        <p:cTn xmlns:p14="http://schemas.microsoft.com/office/powerpoint/2010/main" id="1" dur="indefinite" restart="never" nodeType="tmRoot"/>
+        <p:cTn id="1" dur="indefinite" restart="never" nodeType="tmRoot"/>
       </p:par>
     </p:tnLst>
   </p:timing>
@@ -19461,11 +18680,11 @@
   <p:clrMapOvr>
     <a:masterClrMapping/>
   </p:clrMapOvr>
-  <p:transition xmlns:p14="http://schemas.microsoft.com/office/powerpoint/2010/main"/>
+  <p:transition/>
   <p:timing>
     <p:tnLst>
       <p:par>
-        <p:cTn xmlns:p14="http://schemas.microsoft.com/office/powerpoint/2010/main" id="1" dur="indefinite" restart="never" nodeType="tmRoot">
+        <p:cTn id="1" dur="indefinite" restart="never" nodeType="tmRoot">
           <p:childTnLst>
             <p:seq concurrent="1" nextAc="seek">
               <p:cTn id="2" dur="indefinite" nodeType="mainSeq">
@@ -19749,11 +18968,11 @@
   <p:clrMapOvr>
     <a:masterClrMapping/>
   </p:clrMapOvr>
-  <p:transition xmlns:p14="http://schemas.microsoft.com/office/powerpoint/2010/main"/>
+  <p:transition/>
   <p:timing>
     <p:tnLst>
       <p:par>
-        <p:cTn xmlns:p14="http://schemas.microsoft.com/office/powerpoint/2010/main" id="1" dur="indefinite" restart="never" nodeType="tmRoot"/>
+        <p:cTn id="1" dur="indefinite" restart="never" nodeType="tmRoot"/>
       </p:par>
     </p:tnLst>
   </p:timing>
@@ -19856,7 +19075,7 @@
         <p:spPr>
           <a:xfrm>
             <a:off x="566737" y="1104900"/>
-            <a:ext cx="8382000" cy="3877985"/>
+            <a:ext cx="8382000" cy="3508653"/>
           </a:xfrm>
           <a:prstGeom prst="rect">
             <a:avLst/>
@@ -19919,21 +19138,7 @@
                 <a:latin typeface="PFDinTextCompPro-Italic"/>
                 <a:cs typeface="PFDinTextCompPro-Italic"/>
               </a:rPr>
-              <a:t>are </a:t>
-            </a:r>
-            <a:r>
-              <a:rPr lang="en-US" sz="2800" b="1" dirty="0">
-                <a:latin typeface="PFDinTextCompPro-Italic"/>
-                <a:cs typeface="PFDinTextCompPro-Italic"/>
-              </a:rPr>
-              <a:t>conditionally independent</a:t>
-            </a:r>
-            <a:r>
-              <a:rPr lang="en-US" sz="2800" dirty="0">
-                <a:latin typeface="PFDinTextCompPro-Italic"/>
-                <a:cs typeface="PFDinTextCompPro-Italic"/>
-              </a:rPr>
-              <a:t> from each other:</a:t>
+              <a:t>are conditionally independent from each other:</a:t>
             </a:r>
           </a:p>
           <a:p>
@@ -19975,10 +19180,17 @@
                 <a:latin typeface="+mn-lt"/>
                 <a:cs typeface="PFDinTextCompPro-Italic"/>
               </a:rPr>
-              <a:t> =  P({x</a:t>
-            </a:r>
-            <a:r>
-              <a:rPr lang="en-US" sz="2000" i="1" baseline="-25000" dirty="0" smtClean="0">
+              <a:t> =  </a:t>
+            </a:r>
+            <a:r>
+              <a:rPr lang="en-US" sz="2000" i="1" smtClean="0">
+                <a:latin typeface="+mn-lt"/>
+                <a:cs typeface="PFDinTextCompPro-Italic"/>
+              </a:rPr>
+              <a:t>P({x</a:t>
+            </a:r>
+            <a:r>
+              <a:rPr lang="en-US" sz="2000" i="1" baseline="-25000" smtClean="0">
                 <a:latin typeface="+mn-lt"/>
                 <a:cs typeface="PFDinTextCompPro-Italic"/>
               </a:rPr>
@@ -20003,28 +19215,42 @@
                 <a:latin typeface="+mn-lt"/>
                 <a:cs typeface="PFDinTextCompPro-Italic"/>
               </a:rPr>
-              <a:t>, …, </a:t>
-            </a:r>
-            <a:r>
-              <a:rPr lang="en-US" sz="2000" i="1" dirty="0" err="1" smtClean="0">
+              <a:t>, </a:t>
+            </a:r>
+            <a:r>
+              <a:rPr lang="en-US" sz="2000" i="1">
+                <a:latin typeface="+mn-lt"/>
+                <a:cs typeface="PFDinTextCompPro-Italic"/>
+              </a:rPr>
+              <a:t>…, </a:t>
+            </a:r>
+            <a:r>
+              <a:rPr lang="en-US" sz="2000" i="1" smtClean="0">
                 <a:latin typeface="+mn-lt"/>
                 <a:cs typeface="PFDinTextCompPro-Italic"/>
               </a:rPr>
               <a:t>x</a:t>
             </a:r>
             <a:r>
-              <a:rPr lang="en-US" sz="2000" i="1" baseline="-25000" dirty="0" err="1" smtClean="0">
+              <a:rPr lang="en-US" sz="2000" i="1" baseline="-25000" smtClean="0">
                 <a:latin typeface="+mn-lt"/>
                 <a:cs typeface="PFDinTextCompPro-Italic"/>
               </a:rPr>
               <a:t>n</a:t>
             </a:r>
             <a:r>
+              <a:rPr lang="en-US" sz="2000" i="1" smtClean="0">
+                <a:latin typeface="+mn-lt"/>
+                <a:cs typeface="PFDinTextCompPro-Italic"/>
+              </a:rPr>
+              <a:t>}|C</a:t>
+            </a:r>
+            <a:r>
               <a:rPr lang="en-US" sz="2000" i="1" dirty="0" smtClean="0">
                 <a:latin typeface="+mn-lt"/>
                 <a:cs typeface="PFDinTextCompPro-Italic"/>
               </a:rPr>
-              <a:t>}|C)  ≈   P(x</a:t>
+              <a:t>)  ≈   P(x</a:t>
             </a:r>
             <a:r>
               <a:rPr lang="en-US" sz="2000" i="1" baseline="-25000" dirty="0" smtClean="0">
@@ -20130,11 +19356,11 @@
   <p:clrMapOvr>
     <a:masterClrMapping/>
   </p:clrMapOvr>
-  <p:transition xmlns:p14="http://schemas.microsoft.com/office/powerpoint/2010/main"/>
+  <p:transition/>
   <p:timing>
     <p:tnLst>
       <p:par>
-        <p:cTn xmlns:p14="http://schemas.microsoft.com/office/powerpoint/2010/main" id="1" dur="indefinite" restart="never" nodeType="tmRoot">
+        <p:cTn id="1" dur="indefinite" restart="never" nodeType="tmRoot">
           <p:childTnLst>
             <p:seq concurrent="1" nextAc="seek">
               <p:cTn id="2" dur="indefinite" nodeType="mainSeq">
@@ -20406,7 +19632,7 @@
         <p:spPr>
           <a:xfrm>
             <a:off x="566737" y="2326600"/>
-            <a:ext cx="8382000" cy="1538883"/>
+            <a:ext cx="8382000" cy="2677656"/>
           </a:xfrm>
           <a:prstGeom prst="rect">
             <a:avLst/>
@@ -20421,140 +19647,84 @@
           <a:p>
             <a:pPr algn="l"/>
             <a:r>
-              <a:rPr lang="en-US" sz="1400" dirty="0" smtClean="0">
+              <a:rPr lang="en-US" sz="2400" dirty="0" smtClean="0">
                 <a:latin typeface="PFDinTextCompPro-Italic"/>
                 <a:cs typeface="PFDinTextCompPro-Italic"/>
               </a:rPr>
               <a:t>In summary, the </a:t>
             </a:r>
             <a:r>
-              <a:rPr lang="en-US" sz="1400" b="1" dirty="0" smtClean="0">
+              <a:rPr lang="en-US" sz="2400" dirty="0" smtClean="0">
                 <a:latin typeface="PFDinTextCompPro-Medium" panose="02000500000000020004" pitchFamily="2" charset="0"/>
                 <a:cs typeface="PFDinTextCompPro-Italic"/>
               </a:rPr>
               <a:t>training phase</a:t>
             </a:r>
             <a:r>
-              <a:rPr lang="en-US" sz="1400" b="1" dirty="0" smtClean="0">
+              <a:rPr lang="en-US" sz="2400" dirty="0" smtClean="0">
                 <a:latin typeface="PFDinTextCompPro-Italic"/>
                 <a:cs typeface="PFDinTextCompPro-Italic"/>
               </a:rPr>
-              <a:t> </a:t>
-            </a:r>
-            <a:r>
-              <a:rPr lang="en-US" sz="1400" dirty="0" smtClean="0">
-                <a:latin typeface="PFDinTextCompPro-Italic"/>
-                <a:cs typeface="PFDinTextCompPro-Italic"/>
-              </a:rPr>
-              <a:t>of the model involves computing the </a:t>
-            </a:r>
-            <a:r>
-              <a:rPr lang="en-US" sz="1400" b="1" dirty="0" smtClean="0">
+              <a:t> of the model involves computing the </a:t>
+            </a:r>
+            <a:r>
+              <a:rPr lang="en-US" sz="2400" dirty="0" smtClean="0">
                 <a:latin typeface="PFDinTextCompPro-Medium" panose="02000500000000020004" pitchFamily="2" charset="0"/>
                 <a:cs typeface="PFDinTextCompPro-Italic"/>
               </a:rPr>
               <a:t>likelihood function</a:t>
             </a:r>
             <a:r>
-              <a:rPr lang="en-US" sz="1400" dirty="0" smtClean="0">
+              <a:rPr lang="en-US" sz="2400" dirty="0" smtClean="0">
                 <a:latin typeface="PFDinTextCompPro-Italic"/>
                 <a:cs typeface="PFDinTextCompPro-Italic"/>
               </a:rPr>
-              <a:t>, which is the conditional probability of each feature given each class</a:t>
-            </a:r>
-            <a:r>
-              <a:rPr lang="en-US" sz="1400" dirty="0" smtClean="0">
-                <a:latin typeface="PFDinTextCompPro-Italic"/>
-                <a:cs typeface="PFDinTextCompPro-Italic"/>
-              </a:rPr>
-              <a:t>.</a:t>
+              <a:t>, which is the conditional probability of each feature given each class.</a:t>
             </a:r>
           </a:p>
           <a:p>
             <a:pPr algn="l"/>
-            <a:r>
-              <a:rPr lang="en-US" sz="1400" dirty="0">
-                <a:latin typeface="PFDinTextCompPro-Italic"/>
-                <a:cs typeface="PFDinTextCompPro-Italic"/>
-              </a:rPr>
-              <a:t>	</a:t>
-            </a:r>
-            <a:r>
-              <a:rPr lang="en-US" sz="1400" dirty="0" smtClean="0">
-                <a:latin typeface="PFDinTextCompPro-Italic"/>
-                <a:cs typeface="PFDinTextCompPro-Italic"/>
-              </a:rPr>
-              <a:t>counts the unique words and finds the </a:t>
-            </a:r>
-            <a:r>
-              <a:rPr lang="en-US" sz="1400" dirty="0" err="1" smtClean="0">
-                <a:latin typeface="PFDinTextCompPro-Italic"/>
-                <a:cs typeface="PFDinTextCompPro-Italic"/>
-              </a:rPr>
-              <a:t>prob</a:t>
-            </a:r>
-            <a:r>
-              <a:rPr lang="en-US" sz="1400" dirty="0" smtClean="0">
-                <a:latin typeface="PFDinTextCompPro-Italic"/>
-                <a:cs typeface="PFDinTextCompPro-Italic"/>
-              </a:rPr>
-              <a:t> of each email with the word is spam</a:t>
-            </a:r>
-            <a:endParaRPr lang="en-US" sz="1400" dirty="0" smtClean="0">
+            <a:endParaRPr lang="en-US" sz="2400" dirty="0">
               <a:latin typeface="PFDinTextCompPro-Italic"/>
               <a:cs typeface="PFDinTextCompPro-Italic"/>
             </a:endParaRPr>
           </a:p>
           <a:p>
             <a:pPr algn="l"/>
-            <a:endParaRPr lang="en-US" sz="1400" dirty="0">
-              <a:latin typeface="PFDinTextCompPro-Italic"/>
-              <a:cs typeface="PFDinTextCompPro-Italic"/>
-            </a:endParaRPr>
-          </a:p>
-          <a:p>
-            <a:pPr algn="l"/>
-            <a:r>
-              <a:rPr lang="en-US" sz="1400" dirty="0" smtClean="0">
+            <a:r>
+              <a:rPr lang="en-US" sz="2400" dirty="0" smtClean="0">
                 <a:latin typeface="PFDinTextCompPro-Italic"/>
                 <a:cs typeface="PFDinTextCompPro-Italic"/>
               </a:rPr>
               <a:t>The </a:t>
             </a:r>
             <a:r>
-              <a:rPr lang="en-US" sz="1400" dirty="0" smtClean="0">
+              <a:rPr lang="en-US" sz="2400" dirty="0" smtClean="0">
                 <a:latin typeface="PFDinTextCompPro-Medium" panose="02000500000000020004" pitchFamily="2" charset="0"/>
                 <a:cs typeface="PFDinTextCompPro-Italic"/>
               </a:rPr>
               <a:t>prediction phase</a:t>
             </a:r>
             <a:r>
-              <a:rPr lang="en-US" sz="1400" dirty="0" smtClean="0">
+              <a:rPr lang="en-US" sz="2400" dirty="0" smtClean="0">
                 <a:latin typeface="PFDinTextCompPro-Italic"/>
                 <a:cs typeface="PFDinTextCompPro-Italic"/>
               </a:rPr>
               <a:t> of the model involves computing the </a:t>
             </a:r>
             <a:r>
-              <a:rPr lang="en-US" sz="1400" dirty="0" smtClean="0">
+              <a:rPr lang="en-US" sz="2400" dirty="0" smtClean="0">
                 <a:latin typeface="PFDinTextCompPro-Medium" panose="02000500000000020004" pitchFamily="2" charset="0"/>
                 <a:cs typeface="PFDinTextCompPro-Italic"/>
               </a:rPr>
               <a:t>posterior probability</a:t>
             </a:r>
             <a:r>
-              <a:rPr lang="en-US" sz="1400" dirty="0" smtClean="0">
-                <a:latin typeface="PFDinTextCompPro-Italic"/>
-                <a:cs typeface="PFDinTextCompPro-Italic"/>
-              </a:rPr>
-              <a:t> of each class given the observed features, and choosing the class with the highest probability</a:t>
-            </a:r>
-            <a:r>
               <a:rPr lang="en-US" sz="2400" dirty="0" smtClean="0">
                 <a:latin typeface="PFDinTextCompPro-Italic"/>
                 <a:cs typeface="PFDinTextCompPro-Italic"/>
               </a:rPr>
-              <a:t>.</a:t>
+              <a:t> of each class given the observed features, and choosing the class with the highest probability.</a:t>
             </a:r>
           </a:p>
         </p:txBody>
@@ -20588,7 +19758,7 @@
           <a:effectLst/>
           <a:extLst>
             <a:ext uri="{AF507438-7753-43e0-B8FC-AC1667EBCBE1}">
-              <a14:hiddenEffects xmlns:a14="http://schemas.microsoft.com/office/drawing/2010/main">
+              <a14:hiddenEffects xmlns:a14="http://schemas.microsoft.com/office/drawing/2010/main" xmlns="">
                 <a:effectLst>
                   <a:outerShdw blurRad="63500" dist="38099" dir="2700000" algn="ctr" rotWithShape="0">
                     <a:schemeClr val="bg2">
@@ -20630,7 +19800,7 @@
           <a:effectLst/>
           <a:extLst>
             <a:ext uri="{AF507438-7753-43e0-B8FC-AC1667EBCBE1}">
-              <a14:hiddenEffects xmlns:a14="http://schemas.microsoft.com/office/drawing/2010/main">
+              <a14:hiddenEffects xmlns:a14="http://schemas.microsoft.com/office/drawing/2010/main" xmlns="">
                 <a:effectLst>
                   <a:outerShdw blurRad="63500" dist="38099" dir="2700000" algn="ctr" rotWithShape="0">
                     <a:schemeClr val="bg2">
@@ -20653,11 +19823,11 @@
   <p:clrMapOvr>
     <a:masterClrMapping/>
   </p:clrMapOvr>
-  <p:transition xmlns:p14="http://schemas.microsoft.com/office/powerpoint/2010/main"/>
+  <p:transition/>
   <p:timing>
     <p:tnLst>
       <p:par>
-        <p:cTn xmlns:p14="http://schemas.microsoft.com/office/powerpoint/2010/main" id="1" dur="indefinite" restart="never" nodeType="tmRoot">
+        <p:cTn id="1" dur="indefinite" restart="never" nodeType="tmRoot">
           <p:childTnLst>
             <p:seq concurrent="1" nextAc="seek">
               <p:cTn id="2" dur="indefinite" nodeType="mainSeq">
@@ -20717,7 +19887,7 @@
                                         <p:tgtEl>
                                           <p:spTgt spid="10">
                                             <p:txEl>
-                                              <p:pRg st="3" end="3"/>
+                                              <p:pRg st="2" end="2"/>
                                             </p:txEl>
                                           </p:spTgt>
                                         </p:tgtEl>
@@ -20904,11 +20074,11 @@
   <p:clrMapOvr>
     <a:masterClrMapping/>
   </p:clrMapOvr>
-  <p:transition xmlns:p14="http://schemas.microsoft.com/office/powerpoint/2010/main"/>
+  <p:transition/>
   <p:timing>
     <p:tnLst>
       <p:par>
-        <p:cTn xmlns:p14="http://schemas.microsoft.com/office/powerpoint/2010/main" id="1" dur="indefinite" restart="never" nodeType="tmRoot"/>
+        <p:cTn id="1" dur="indefinite" restart="never" nodeType="tmRoot"/>
       </p:par>
     </p:tnLst>
   </p:timing>
@@ -21507,11 +20677,11 @@
   <p:clrMapOvr>
     <a:masterClrMapping/>
   </p:clrMapOvr>
-  <p:transition xmlns:p14="http://schemas.microsoft.com/office/powerpoint/2010/main"/>
+  <p:transition/>
   <p:timing>
     <p:tnLst>
       <p:par>
-        <p:cTn xmlns:p14="http://schemas.microsoft.com/office/powerpoint/2010/main" id="1" dur="indefinite" restart="never" nodeType="tmRoot">
+        <p:cTn id="1" dur="indefinite" restart="never" nodeType="tmRoot">
           <p:childTnLst>
             <p:seq concurrent="1" nextAc="seek">
               <p:cTn id="2" dur="indefinite" nodeType="mainSeq">
@@ -22241,11 +21411,11 @@
   <p:clrMapOvr>
     <a:masterClrMapping/>
   </p:clrMapOvr>
-  <p:transition xmlns:p14="http://schemas.microsoft.com/office/powerpoint/2010/main"/>
+  <p:transition/>
   <p:timing>
     <p:tnLst>
       <p:par>
-        <p:cTn xmlns:p14="http://schemas.microsoft.com/office/powerpoint/2010/main" id="1" dur="indefinite" restart="never" nodeType="tmRoot"/>
+        <p:cTn id="1" dur="indefinite" restart="never" nodeType="tmRoot"/>
       </p:par>
     </p:tnLst>
   </p:timing>
@@ -23284,11 +22454,11 @@
   <p:clrMapOvr>
     <a:masterClrMapping/>
   </p:clrMapOvr>
-  <p:transition xmlns:p14="http://schemas.microsoft.com/office/powerpoint/2010/main"/>
+  <p:transition/>
   <p:timing>
     <p:tnLst>
       <p:par>
-        <p:cTn xmlns:p14="http://schemas.microsoft.com/office/powerpoint/2010/main" id="1" dur="indefinite" restart="never" nodeType="tmRoot">
+        <p:cTn id="1" dur="indefinite" restart="never" nodeType="tmRoot">
           <p:childTnLst>
             <p:seq concurrent="1" nextAc="seek">
               <p:cTn id="2" dur="indefinite" nodeType="mainSeq">
@@ -24463,11 +23633,11 @@
   <p:clrMapOvr>
     <a:masterClrMapping/>
   </p:clrMapOvr>
-  <p:transition xmlns:p14="http://schemas.microsoft.com/office/powerpoint/2010/main"/>
+  <p:transition/>
   <p:timing>
     <p:tnLst>
       <p:par>
-        <p:cTn xmlns:p14="http://schemas.microsoft.com/office/powerpoint/2010/main" id="1" dur="indefinite" restart="never" nodeType="tmRoot"/>
+        <p:cTn id="1" dur="indefinite" restart="never" nodeType="tmRoot"/>
       </p:par>
     </p:tnLst>
   </p:timing>
@@ -25114,14 +24284,14 @@
           </a:ln>
           <a:extLst>
             <a:ext uri="{909E8E84-426E-40dd-AFC4-6F175D3DCCD1}">
-              <a14:hiddenFill xmlns:a14="http://schemas.microsoft.com/office/drawing/2010/main">
+              <a14:hiddenFill xmlns:a14="http://schemas.microsoft.com/office/drawing/2010/main" xmlns="">
                 <a:solidFill>
                   <a:schemeClr val="accent1"/>
                 </a:solidFill>
               </a14:hiddenFill>
             </a:ext>
             <a:ext uri="{91240B29-F687-4f45-9708-019B960494DF}">
-              <a14:hiddenLine xmlns:a14="http://schemas.microsoft.com/office/drawing/2010/main" w="9525">
+              <a14:hiddenLine xmlns:a14="http://schemas.microsoft.com/office/drawing/2010/main" xmlns="" w="9525">
                 <a:solidFill>
                   <a:schemeClr val="tx1"/>
                 </a:solidFill>
@@ -25143,11 +24313,11 @@
   <p:clrMapOvr>
     <a:masterClrMapping/>
   </p:clrMapOvr>
-  <p:transition xmlns:p14="http://schemas.microsoft.com/office/powerpoint/2010/main"/>
+  <p:transition/>
   <p:timing>
     <p:tnLst>
       <p:par>
-        <p:cTn xmlns:p14="http://schemas.microsoft.com/office/powerpoint/2010/main" id="1" dur="indefinite" restart="never" nodeType="tmRoot"/>
+        <p:cTn id="1" dur="indefinite" restart="never" nodeType="tmRoot"/>
       </p:par>
     </p:tnLst>
   </p:timing>
@@ -25269,14 +24439,14 @@
           </a:ln>
           <a:extLst>
             <a:ext uri="{909E8E84-426E-40dd-AFC4-6F175D3DCCD1}">
-              <a14:hiddenFill xmlns:a14="http://schemas.microsoft.com/office/drawing/2010/main">
+              <a14:hiddenFill xmlns:a14="http://schemas.microsoft.com/office/drawing/2010/main" xmlns="">
                 <a:solidFill>
                   <a:schemeClr val="accent1"/>
                 </a:solidFill>
               </a14:hiddenFill>
             </a:ext>
             <a:ext uri="{91240B29-F687-4f45-9708-019B960494DF}">
-              <a14:hiddenLine xmlns:a14="http://schemas.microsoft.com/office/drawing/2010/main" w="9525">
+              <a14:hiddenLine xmlns:a14="http://schemas.microsoft.com/office/drawing/2010/main" xmlns="" w="9525">
                 <a:solidFill>
                   <a:schemeClr val="tx1"/>
                 </a:solidFill>
@@ -25312,7 +24482,7 @@
           <a:p>
             <a:pPr algn="l"/>
             <a:r>
-              <a:rPr lang="en-US" sz="2300" b="1" dirty="0" smtClean="0">
+              <a:rPr lang="en-US" sz="2300" dirty="0" smtClean="0">
                 <a:latin typeface="PFDinTextCompPro-Italic"/>
                 <a:cs typeface="PFDinTextCompPro-Italic"/>
               </a:rPr>
@@ -25330,21 +24500,7 @@
                 <a:latin typeface="PFDinTextCompPro-Italic"/>
                 <a:cs typeface="PFDinTextCompPro-Italic"/>
               </a:rPr>
-              <a:t>. </a:t>
-            </a:r>
-            <a:r>
-              <a:rPr lang="en-US" sz="2300" b="1" dirty="0" smtClean="0">
-                <a:latin typeface="PFDinTextCompPro-Italic"/>
-                <a:cs typeface="PFDinTextCompPro-Italic"/>
-              </a:rPr>
-              <a:t>This universe is known as the</a:t>
-            </a:r>
-            <a:r>
-              <a:rPr lang="en-US" sz="2300" dirty="0" smtClean="0">
-                <a:latin typeface="PFDinTextCompPro-Italic"/>
-                <a:cs typeface="PFDinTextCompPro-Italic"/>
-              </a:rPr>
-              <a:t> </a:t>
+              <a:t>. This universe is known as the </a:t>
             </a:r>
             <a:r>
               <a:rPr lang="en-US" sz="2300" dirty="0" smtClean="0">
@@ -25375,14 +24531,7 @@
                 <a:latin typeface="PFDinTextCompPro-Italic"/>
                 <a:cs typeface="PFDinTextCompPro-Italic"/>
               </a:rPr>
-              <a:t>Q: </a:t>
-            </a:r>
-            <a:r>
-              <a:rPr lang="en-US" sz="2300" b="1" dirty="0" smtClean="0">
-                <a:latin typeface="PFDinTextCompPro-Italic"/>
-                <a:cs typeface="PFDinTextCompPro-Italic"/>
-              </a:rPr>
-              <a:t>What are the mutually exclusive events that make up the sample space for a coin flip?</a:t>
+              <a:t>Q: What are the mutually exclusive events that make up the sample space for a coin flip?</a:t>
             </a:r>
           </a:p>
         </p:txBody>
@@ -25397,11 +24546,11 @@
   <p:clrMapOvr>
     <a:masterClrMapping/>
   </p:clrMapOvr>
-  <p:transition xmlns:p14="http://schemas.microsoft.com/office/powerpoint/2010/main"/>
+  <p:transition/>
   <p:timing>
     <p:tnLst>
       <p:par>
-        <p:cTn xmlns:p14="http://schemas.microsoft.com/office/powerpoint/2010/main" id="1" dur="indefinite" restart="never" nodeType="tmRoot">
+        <p:cTn id="1" dur="indefinite" restart="never" nodeType="tmRoot">
           <p:childTnLst>
             <p:seq concurrent="1" nextAc="seek">
               <p:cTn id="2" dur="indefinite" nodeType="mainSeq">
@@ -25644,14 +24793,14 @@
           </a:ln>
           <a:extLst>
             <a:ext uri="{909E8E84-426E-40dd-AFC4-6F175D3DCCD1}">
-              <a14:hiddenFill xmlns:a14="http://schemas.microsoft.com/office/drawing/2010/main">
+              <a14:hiddenFill xmlns:a14="http://schemas.microsoft.com/office/drawing/2010/main" xmlns="">
                 <a:solidFill>
                   <a:schemeClr val="accent1"/>
                 </a:solidFill>
               </a14:hiddenFill>
             </a:ext>
             <a:ext uri="{91240B29-F687-4f45-9708-019B960494DF}">
-              <a14:hiddenLine xmlns:a14="http://schemas.microsoft.com/office/drawing/2010/main" w="9525">
+              <a14:hiddenLine xmlns:a14="http://schemas.microsoft.com/office/drawing/2010/main" xmlns="" w="9525">
                 <a:solidFill>
                   <a:schemeClr val="tx1"/>
                 </a:solidFill>
@@ -25761,11 +24910,11 @@
   <p:clrMapOvr>
     <a:masterClrMapping/>
   </p:clrMapOvr>
-  <p:transition xmlns:p14="http://schemas.microsoft.com/office/powerpoint/2010/main"/>
+  <p:transition/>
   <p:timing>
     <p:tnLst>
       <p:par>
-        <p:cTn xmlns:p14="http://schemas.microsoft.com/office/powerpoint/2010/main" id="1" dur="indefinite" restart="never" nodeType="tmRoot">
+        <p:cTn id="1" dur="indefinite" restart="never" nodeType="tmRoot">
           <p:childTnLst>
             <p:seq concurrent="1" nextAc="seek">
               <p:cTn id="2" dur="indefinite" nodeType="mainSeq">
@@ -26057,14 +25206,14 @@
           </a:ln>
           <a:extLst>
             <a:ext uri="{909E8E84-426E-40dd-AFC4-6F175D3DCCD1}">
-              <a14:hiddenFill xmlns:a14="http://schemas.microsoft.com/office/drawing/2010/main">
+              <a14:hiddenFill xmlns:a14="http://schemas.microsoft.com/office/drawing/2010/main" xmlns="">
                 <a:solidFill>
                   <a:schemeClr val="accent1"/>
                 </a:solidFill>
               </a14:hiddenFill>
             </a:ext>
             <a:ext uri="{91240B29-F687-4f45-9708-019B960494DF}">
-              <a14:hiddenLine xmlns:a14="http://schemas.microsoft.com/office/drawing/2010/main" w="9525">
+              <a14:hiddenLine xmlns:a14="http://schemas.microsoft.com/office/drawing/2010/main" xmlns="" w="9525">
                 <a:solidFill>
                   <a:schemeClr val="tx1"/>
                 </a:solidFill>
@@ -26174,11 +25323,11 @@
   <p:clrMapOvr>
     <a:masterClrMapping/>
   </p:clrMapOvr>
-  <p:transition xmlns:p14="http://schemas.microsoft.com/office/powerpoint/2010/main"/>
+  <p:transition/>
   <p:timing>
     <p:tnLst>
       <p:par>
-        <p:cTn xmlns:p14="http://schemas.microsoft.com/office/powerpoint/2010/main" id="1" dur="indefinite" restart="never" nodeType="tmRoot">
+        <p:cTn id="1" dur="indefinite" restart="never" nodeType="tmRoot">
           <p:childTnLst>
             <p:seq concurrent="1" nextAc="seek">
               <p:cTn id="2" dur="indefinite" nodeType="mainSeq">
@@ -26421,14 +25570,14 @@
           </a:ln>
           <a:extLst>
             <a:ext uri="{909E8E84-426E-40dd-AFC4-6F175D3DCCD1}">
-              <a14:hiddenFill xmlns:a14="http://schemas.microsoft.com/office/drawing/2010/main">
+              <a14:hiddenFill xmlns:a14="http://schemas.microsoft.com/office/drawing/2010/main" xmlns="">
                 <a:solidFill>
                   <a:schemeClr val="accent1"/>
                 </a:solidFill>
               </a14:hiddenFill>
             </a:ext>
             <a:ext uri="{91240B29-F687-4f45-9708-019B960494DF}">
-              <a14:hiddenLine xmlns:a14="http://schemas.microsoft.com/office/drawing/2010/main" w="9525">
+              <a14:hiddenLine xmlns:a14="http://schemas.microsoft.com/office/drawing/2010/main" xmlns="" w="9525">
                 <a:solidFill>
                   <a:schemeClr val="tx1"/>
                 </a:solidFill>
@@ -26551,11 +25700,11 @@
   <p:clrMapOvr>
     <a:masterClrMapping/>
   </p:clrMapOvr>
-  <p:transition xmlns:p14="http://schemas.microsoft.com/office/powerpoint/2010/main"/>
+  <p:transition/>
   <p:timing>
     <p:tnLst>
       <p:par>
-        <p:cTn xmlns:p14="http://schemas.microsoft.com/office/powerpoint/2010/main" id="1" dur="indefinite" restart="never" nodeType="tmRoot">
+        <p:cTn id="1" dur="indefinite" restart="never" nodeType="tmRoot">
           <p:childTnLst>
             <p:seq concurrent="1" nextAc="seek">
               <p:cTn id="2" dur="indefinite" nodeType="mainSeq">
@@ -26896,14 +26045,14 @@
           </a:ln>
           <a:extLst>
             <a:ext uri="{909E8E84-426E-40dd-AFC4-6F175D3DCCD1}">
-              <a14:hiddenFill xmlns:a14="http://schemas.microsoft.com/office/drawing/2010/main">
+              <a14:hiddenFill xmlns:a14="http://schemas.microsoft.com/office/drawing/2010/main" xmlns="">
                 <a:solidFill>
                   <a:schemeClr val="accent1"/>
                 </a:solidFill>
               </a14:hiddenFill>
             </a:ext>
             <a:ext uri="{91240B29-F687-4f45-9708-019B960494DF}">
-              <a14:hiddenLine xmlns:a14="http://schemas.microsoft.com/office/drawing/2010/main" w="9525">
+              <a14:hiddenLine xmlns:a14="http://schemas.microsoft.com/office/drawing/2010/main" xmlns="" w="9525">
                 <a:solidFill>
                   <a:schemeClr val="tx1"/>
                 </a:solidFill>
@@ -26985,11 +26134,11 @@
   <p:clrMapOvr>
     <a:masterClrMapping/>
   </p:clrMapOvr>
-  <p:transition xmlns:p14="http://schemas.microsoft.com/office/powerpoint/2010/main"/>
+  <p:transition/>
   <p:timing>
     <p:tnLst>
       <p:par>
-        <p:cTn xmlns:p14="http://schemas.microsoft.com/office/powerpoint/2010/main" id="1" dur="indefinite" restart="never" nodeType="tmRoot">
+        <p:cTn id="1" dur="indefinite" restart="never" nodeType="tmRoot">
           <p:childTnLst>
             <p:seq concurrent="1" nextAc="seek">
               <p:cTn id="2" dur="indefinite" nodeType="mainSeq">
@@ -27281,14 +26430,14 @@
           </a:ln>
           <a:extLst>
             <a:ext uri="{909E8E84-426E-40dd-AFC4-6F175D3DCCD1}">
-              <a14:hiddenFill xmlns:a14="http://schemas.microsoft.com/office/drawing/2010/main">
+              <a14:hiddenFill xmlns:a14="http://schemas.microsoft.com/office/drawing/2010/main" xmlns="">
                 <a:solidFill>
                   <a:schemeClr val="accent1"/>
                 </a:solidFill>
               </a14:hiddenFill>
             </a:ext>
             <a:ext uri="{91240B29-F687-4f45-9708-019B960494DF}">
-              <a14:hiddenLine xmlns:a14="http://schemas.microsoft.com/office/drawing/2010/main" w="9525">
+              <a14:hiddenLine xmlns:a14="http://schemas.microsoft.com/office/drawing/2010/main" xmlns="" w="9525">
                 <a:solidFill>
                   <a:schemeClr val="tx1"/>
                 </a:solidFill>
@@ -27367,11 +26516,11 @@
   <p:clrMapOvr>
     <a:masterClrMapping/>
   </p:clrMapOvr>
-  <p:transition xmlns:p14="http://schemas.microsoft.com/office/powerpoint/2010/main"/>
+  <p:transition/>
   <p:timing>
     <p:tnLst>
       <p:par>
-        <p:cTn xmlns:p14="http://schemas.microsoft.com/office/powerpoint/2010/main" id="1" dur="indefinite" restart="never" nodeType="tmRoot">
+        <p:cTn id="1" dur="indefinite" restart="never" nodeType="tmRoot">
           <p:childTnLst>
             <p:seq concurrent="1" nextAc="seek">
               <p:cTn id="2" dur="indefinite" nodeType="mainSeq">
@@ -27745,7 +26894,7 @@
         <a:effectLst/>
         <a:extLst>
           <a:ext uri="{AF507438-7753-43e0-B8FC-AC1667EBCBE1}">
-            <a14:hiddenEffects xmlns:a14="http://schemas.microsoft.com/office/drawing/2010/main">
+            <a14:hiddenEffects xmlns:a14="http://schemas.microsoft.com/office/drawing/2010/main" xmlns="">
               <a:effectLst>
                 <a:outerShdw blurRad="63500" dist="38099" dir="2700000" algn="ctr" rotWithShape="0">
                   <a:schemeClr val="bg2">
@@ -27823,7 +26972,7 @@
         <a:effectLst/>
         <a:extLst>
           <a:ext uri="{AF507438-7753-43e0-B8FC-AC1667EBCBE1}">
-            <a14:hiddenEffects xmlns:a14="http://schemas.microsoft.com/office/drawing/2010/main">
+            <a14:hiddenEffects xmlns:a14="http://schemas.microsoft.com/office/drawing/2010/main" xmlns="">
               <a:effectLst>
                 <a:outerShdw blurRad="63500" dist="38099" dir="2700000" algn="ctr" rotWithShape="0">
                   <a:schemeClr val="bg2">
@@ -28165,7 +27314,7 @@
         <a:effectLst/>
         <a:extLst>
           <a:ext uri="{AF507438-7753-43e0-B8FC-AC1667EBCBE1}">
-            <a14:hiddenEffects xmlns:a14="http://schemas.microsoft.com/office/drawing/2010/main">
+            <a14:hiddenEffects xmlns:a14="http://schemas.microsoft.com/office/drawing/2010/main" xmlns="">
               <a:effectLst>
                 <a:outerShdw blurRad="63500" dist="38099" dir="2700000" algn="ctr" rotWithShape="0">
                   <a:schemeClr val="bg2">
@@ -28231,7 +27380,7 @@
         <a:effectLst/>
         <a:extLst>
           <a:ext uri="{AF507438-7753-43e0-B8FC-AC1667EBCBE1}">
-            <a14:hiddenEffects xmlns:a14="http://schemas.microsoft.com/office/drawing/2010/main">
+            <a14:hiddenEffects xmlns:a14="http://schemas.microsoft.com/office/drawing/2010/main" xmlns="">
               <a:effectLst>
                 <a:outerShdw blurRad="63500" dist="38099" dir="2700000" algn="ctr" rotWithShape="0">
                   <a:schemeClr val="bg2">

</xml_diff>